<commit_message>
Updating pp with notes
</commit_message>
<xml_diff>
--- a/AppleApps2017.pptx
+++ b/AppleApps2017.pptx
@@ -2,29 +2,23 @@
 <file path=ppt/presentation.xml><?xml version="1.0" encoding="utf-8"?>
 <p:presentation xmlns:a="http://schemas.openxmlformats.org/drawingml/2006/main" xmlns:r="http://schemas.openxmlformats.org/officeDocument/2006/relationships" xmlns:p="http://schemas.openxmlformats.org/presentationml/2006/main" saveSubsetFonts="1">
   <p:sldMasterIdLst>
-    <p:sldMasterId id="2147483660" r:id="rId1"/>
+    <p:sldMasterId id="2147483678" r:id="rId1"/>
   </p:sldMasterIdLst>
   <p:notesMasterIdLst>
-    <p:notesMasterId r:id="rId19"/>
+    <p:notesMasterId r:id="rId13"/>
   </p:notesMasterIdLst>
   <p:sldIdLst>
     <p:sldId id="256" r:id="rId2"/>
     <p:sldId id="268" r:id="rId3"/>
-    <p:sldId id="262" r:id="rId4"/>
-    <p:sldId id="266" r:id="rId5"/>
-    <p:sldId id="263" r:id="rId6"/>
-    <p:sldId id="264" r:id="rId7"/>
-    <p:sldId id="265" r:id="rId8"/>
-    <p:sldId id="267" r:id="rId9"/>
-    <p:sldId id="269" r:id="rId10"/>
-    <p:sldId id="274" r:id="rId11"/>
-    <p:sldId id="273" r:id="rId12"/>
-    <p:sldId id="260" r:id="rId13"/>
-    <p:sldId id="270" r:id="rId14"/>
-    <p:sldId id="258" r:id="rId15"/>
-    <p:sldId id="271" r:id="rId16"/>
-    <p:sldId id="259" r:id="rId17"/>
-    <p:sldId id="272" r:id="rId18"/>
+    <p:sldId id="263" r:id="rId4"/>
+    <p:sldId id="264" r:id="rId5"/>
+    <p:sldId id="267" r:id="rId6"/>
+    <p:sldId id="269" r:id="rId7"/>
+    <p:sldId id="274" r:id="rId8"/>
+    <p:sldId id="270" r:id="rId9"/>
+    <p:sldId id="258" r:id="rId10"/>
+    <p:sldId id="271" r:id="rId11"/>
+    <p:sldId id="272" r:id="rId12"/>
   </p:sldIdLst>
   <p:sldSz cx="12192000" cy="6858000"/>
   <p:notesSz cx="6858000" cy="9144000"/>
@@ -130,20 +124,14 @@
           <p14:sldIdLst>
             <p14:sldId id="256"/>
             <p14:sldId id="268"/>
-            <p14:sldId id="262"/>
-            <p14:sldId id="266"/>
             <p14:sldId id="263"/>
             <p14:sldId id="264"/>
-            <p14:sldId id="265"/>
             <p14:sldId id="267"/>
             <p14:sldId id="269"/>
             <p14:sldId id="274"/>
-            <p14:sldId id="273"/>
-            <p14:sldId id="260"/>
             <p14:sldId id="270"/>
             <p14:sldId id="258"/>
             <p14:sldId id="271"/>
-            <p14:sldId id="259"/>
             <p14:sldId id="272"/>
           </p14:sldIdLst>
         </p14:section>
@@ -161,7 +149,7 @@
 
 <file path=ppt/commentAuthors.xml><?xml version="1.0" encoding="utf-8"?>
 <p:cmAuthorLst xmlns:a="http://schemas.openxmlformats.org/drawingml/2006/main" xmlns:r="http://schemas.openxmlformats.org/officeDocument/2006/relationships" xmlns:p="http://schemas.openxmlformats.org/presentationml/2006/main">
-  <p:cmAuthor id="1" name="Suzette Wallin" initials="SW" lastIdx="1" clrIdx="0">
+  <p:cmAuthor id="1" name="Suzette Wallin" initials="SW" lastIdx="3" clrIdx="0">
     <p:extLst>
       <p:ext uri="{19B8F6BF-5375-455C-9EA6-DF929625EA0E}">
         <p15:presenceInfo xmlns:p15="http://schemas.microsoft.com/office/powerpoint/2012/main" userId="Suzette Wallin" providerId="None"/>
@@ -169,20 +157,6 @@
     </p:extLst>
   </p:cmAuthor>
 </p:cmAuthorLst>
-</file>
-
-<file path=ppt/comments/comment1.xml><?xml version="1.0" encoding="utf-8"?>
-<p:cmLst xmlns:a="http://schemas.openxmlformats.org/drawingml/2006/main" xmlns:r="http://schemas.openxmlformats.org/officeDocument/2006/relationships" xmlns:p="http://schemas.openxmlformats.org/presentationml/2006/main">
-  <p:cm authorId="1" dt="2021-11-18T16:44:04.065" idx="1">
-    <p:pos x="10" y="10"/>
-    <p:text/>
-    <p:extLst>
-      <p:ext uri="{C676402C-5697-4E1C-873F-D02D1690AC5C}">
-        <p15:threadingInfo xmlns:p15="http://schemas.microsoft.com/office/powerpoint/2012/main" timeZoneBias="360"/>
-      </p:ext>
-    </p:extLst>
-  </p:cm>
-</p:cmLst>
 </file>
 
 <file path=ppt/notesMasters/notesMaster1.xml><?xml version="1.0" encoding="utf-8"?>
@@ -590,6 +564,9 @@
             </a:r>
           </a:p>
           <a:p>
+            <a:endParaRPr lang="en-US" dirty="0"/>
+          </a:p>
+          <a:p>
             <a:r>
               <a:rPr lang="en-US" b="1" dirty="0"/>
               <a:t>appleStore.csv</a:t>
@@ -981,7 +958,47 @@
           <a:p>
             <a:r>
               <a:rPr lang="en-US" dirty="0"/>
-              <a:t>What surprised me when I did a search to see what was the highest priced app in each category</a:t>
+              <a:t>I did not have many preconceived notions when it came to mobile apps.</a:t>
+            </a:r>
+          </a:p>
+          <a:p>
+            <a:r>
+              <a:rPr lang="en-US" dirty="0"/>
+              <a:t>I had to look up what </a:t>
+            </a:r>
+            <a:r>
+              <a:rPr lang="en-US" dirty="0" err="1"/>
+              <a:t>cont_rating</a:t>
+            </a:r>
+            <a:r>
+              <a:rPr lang="en-US" dirty="0"/>
+              <a:t> was. </a:t>
+            </a:r>
+          </a:p>
+          <a:p>
+            <a:r>
+              <a:rPr lang="en-US" dirty="0"/>
+              <a:t>I was not surprised to see that there are more mobile game apps than any other category</a:t>
+            </a:r>
+          </a:p>
+          <a:p>
+            <a:r>
+              <a:rPr lang="en-US" dirty="0"/>
+              <a:t>I was surprised to see a price for one shopping app.  When you think of a shopping app you think of amazon or </a:t>
+            </a:r>
+            <a:r>
+              <a:rPr lang="en-US" dirty="0" err="1"/>
+              <a:t>ebay</a:t>
+            </a:r>
+            <a:r>
+              <a:rPr lang="en-US" dirty="0"/>
+              <a:t>.  </a:t>
+            </a:r>
+          </a:p>
+          <a:p>
+            <a:r>
+              <a:rPr lang="en-US" dirty="0"/>
+              <a:t>I don’t remember ever seeing any app at 300 dollars. I suppose it was not that surprising that it’s an education app. </a:t>
             </a:r>
           </a:p>
           <a:p>
@@ -1006,7 +1023,7 @@
           <a:p>
             <a:fld id="{C6B88E8F-877C-440D-9740-4815E5BB05AA}" type="slidenum">
               <a:rPr lang="en-US" smtClean="0"/>
-              <a:t>8</a:t>
+              <a:t>2</a:t>
             </a:fld>
             <a:endParaRPr lang="en-US"/>
           </a:p>
@@ -1015,7 +1032,7 @@
     </p:spTree>
     <p:extLst>
       <p:ext uri="{BB962C8B-B14F-4D97-AF65-F5344CB8AC3E}">
-        <p14:creationId xmlns:p14="http://schemas.microsoft.com/office/powerpoint/2010/main" val="2168008297"/>
+        <p14:creationId xmlns:p14="http://schemas.microsoft.com/office/powerpoint/2010/main" val="838985321"/>
       </p:ext>
     </p:extLst>
   </p:cSld>
@@ -1071,8 +1088,52 @@
           <a:p>
             <a:r>
               <a:rPr lang="en-US" dirty="0"/>
-              <a:t>But also the average price for medical apps was much higher than education</a:t>
-            </a:r>
+              <a:t>Checking my Data</a:t>
+            </a:r>
+          </a:p>
+          <a:p>
+            <a:endParaRPr lang="en-US" dirty="0"/>
+          </a:p>
+          <a:p>
+            <a:r>
+              <a:rPr lang="en-US" dirty="0"/>
+              <a:t>Have not found any null characters or NAN</a:t>
+            </a:r>
+          </a:p>
+          <a:p>
+            <a:r>
+              <a:rPr lang="en-US" dirty="0"/>
+              <a:t>The non English text has been my only real aversion</a:t>
+            </a:r>
+          </a:p>
+          <a:p>
+            <a:pPr marL="0" marR="0" lvl="0" indent="0" algn="l" defTabSz="914400" rtl="0" eaLnBrk="1" fontAlgn="auto" latinLnBrk="0" hangingPunct="1">
+              <a:lnSpc>
+                <a:spcPct val="100000"/>
+              </a:lnSpc>
+              <a:spcBef>
+                <a:spcPts val="0"/>
+              </a:spcBef>
+              <a:spcAft>
+                <a:spcPts val="0"/>
+              </a:spcAft>
+              <a:buClrTx/>
+              <a:buSzTx/>
+              <a:buFontTx/>
+              <a:buNone/>
+              <a:tabLst/>
+              <a:defRPr/>
+            </a:pPr>
+            <a:r>
+              <a:rPr lang="en-US" dirty="0"/>
+              <a:t>There are over 7000 records and I knew I wanted to try and tackle translating these. </a:t>
+            </a:r>
+          </a:p>
+          <a:p>
+            <a:endParaRPr lang="en-US" dirty="0"/>
+          </a:p>
+          <a:p>
+            <a:endParaRPr lang="en-US" dirty="0"/>
           </a:p>
         </p:txBody>
       </p:sp>
@@ -1093,7 +1154,7 @@
           <a:p>
             <a:fld id="{C6B88E8F-877C-440D-9740-4815E5BB05AA}" type="slidenum">
               <a:rPr lang="en-US" smtClean="0"/>
-              <a:t>9</a:t>
+              <a:t>3</a:t>
             </a:fld>
             <a:endParaRPr lang="en-US"/>
           </a:p>
@@ -1102,7 +1163,7 @@
     </p:spTree>
     <p:extLst>
       <p:ext uri="{BB962C8B-B14F-4D97-AF65-F5344CB8AC3E}">
-        <p14:creationId xmlns:p14="http://schemas.microsoft.com/office/powerpoint/2010/main" val="1302251736"/>
+        <p14:creationId xmlns:p14="http://schemas.microsoft.com/office/powerpoint/2010/main" val="1107467337"/>
       </p:ext>
     </p:extLst>
   </p:cSld>
@@ -1158,7 +1219,7 @@
           <a:p>
             <a:r>
               <a:rPr lang="en-US" dirty="0"/>
-              <a:t>Not familiar with outside data visualization tools but I wanted to give it a try.  I have some data that a pie chart would be great for. </a:t>
+              <a:t>I was a little surprised to see that an education app could be so high.  </a:t>
             </a:r>
           </a:p>
           <a:p>
@@ -1167,16 +1228,34 @@
           <a:p>
             <a:r>
               <a:rPr lang="en-US" dirty="0"/>
-              <a:t>So I went to </a:t>
+              <a:t>Another data set that was included by this author had the description for each of the apps. So I was able to  join the two data sets and recreate a </a:t>
             </a:r>
             <a:r>
               <a:rPr lang="en-US" dirty="0" err="1"/>
-              <a:t>datawrapper</a:t>
+              <a:t>dataframe</a:t>
             </a:r>
             <a:r>
               <a:rPr lang="en-US" dirty="0"/>
-              <a:t> and inputted some .csv files</a:t>
-            </a:r>
+              <a:t> with the columns I wanted. </a:t>
+            </a:r>
+          </a:p>
+          <a:p>
+            <a:endParaRPr lang="en-US" dirty="0"/>
+          </a:p>
+          <a:p>
+            <a:r>
+              <a:rPr lang="en-US" dirty="0"/>
+              <a:t>Incase if you’re curious like I was.  Lamp Words for Life is a speech therapy app. </a:t>
+            </a:r>
+          </a:p>
+          <a:p>
+            <a:r>
+              <a:rPr lang="en-US" dirty="0"/>
+              <a:t>Proloquo2Go is a symbol-supported communication app. To help others communicate who may not be able to use their voice as well.</a:t>
+            </a:r>
+          </a:p>
+          <a:p>
+            <a:endParaRPr lang="en-US" dirty="0"/>
           </a:p>
           <a:p>
             <a:endParaRPr lang="en-US" dirty="0"/>
@@ -1200,7 +1279,250 @@
           <a:p>
             <a:fld id="{C6B88E8F-877C-440D-9740-4815E5BB05AA}" type="slidenum">
               <a:rPr lang="en-US" smtClean="0"/>
-              <a:t>10</a:t>
+              <a:t>5</a:t>
+            </a:fld>
+            <a:endParaRPr lang="en-US"/>
+          </a:p>
+        </p:txBody>
+      </p:sp>
+    </p:spTree>
+    <p:extLst>
+      <p:ext uri="{BB962C8B-B14F-4D97-AF65-F5344CB8AC3E}">
+        <p14:creationId xmlns:p14="http://schemas.microsoft.com/office/powerpoint/2010/main" val="2168008297"/>
+      </p:ext>
+    </p:extLst>
+  </p:cSld>
+  <p:clrMapOvr>
+    <a:masterClrMapping/>
+  </p:clrMapOvr>
+</p:notes>
+</file>
+
+<file path=ppt/notesSlides/notesSlide5.xml><?xml version="1.0" encoding="utf-8"?>
+<p:notes xmlns:a="http://schemas.openxmlformats.org/drawingml/2006/main" xmlns:r="http://schemas.openxmlformats.org/officeDocument/2006/relationships" xmlns:p="http://schemas.openxmlformats.org/presentationml/2006/main">
+  <p:cSld>
+    <p:spTree>
+      <p:nvGrpSpPr>
+        <p:cNvPr id="1" name=""/>
+        <p:cNvGrpSpPr/>
+        <p:nvPr/>
+      </p:nvGrpSpPr>
+      <p:grpSpPr>
+        <a:xfrm>
+          <a:off x="0" y="0"/>
+          <a:ext cx="0" cy="0"/>
+          <a:chOff x="0" y="0"/>
+          <a:chExt cx="0" cy="0"/>
+        </a:xfrm>
+      </p:grpSpPr>
+      <p:sp>
+        <p:nvSpPr>
+          <p:cNvPr id="2" name="Slide Image Placeholder 1"/>
+          <p:cNvSpPr>
+            <a:spLocks noGrp="1" noRot="1" noChangeAspect="1"/>
+          </p:cNvSpPr>
+          <p:nvPr>
+            <p:ph type="sldImg"/>
+          </p:nvPr>
+        </p:nvSpPr>
+        <p:spPr/>
+      </p:sp>
+      <p:sp>
+        <p:nvSpPr>
+          <p:cNvPr id="3" name="Notes Placeholder 2"/>
+          <p:cNvSpPr>
+            <a:spLocks noGrp="1"/>
+          </p:cNvSpPr>
+          <p:nvPr>
+            <p:ph type="body" idx="1"/>
+          </p:nvPr>
+        </p:nvSpPr>
+        <p:spPr/>
+        <p:txBody>
+          <a:bodyPr/>
+          <a:lstStyle/>
+          <a:p>
+            <a:r>
+              <a:rPr lang="en-US" dirty="0"/>
+              <a:t>But also the average price for medical apps was much higher than education.</a:t>
+            </a:r>
+          </a:p>
+          <a:p>
+            <a:endParaRPr lang="en-US" dirty="0"/>
+          </a:p>
+          <a:p>
+            <a:r>
+              <a:rPr lang="en-US" dirty="0"/>
+              <a:t>Move to </a:t>
+            </a:r>
+            <a:r>
+              <a:rPr lang="en-US" dirty="0" err="1"/>
+              <a:t>Jupyter</a:t>
+            </a:r>
+            <a:r>
+              <a:rPr lang="en-US" dirty="0"/>
+              <a:t> Notebook and show some other charts. </a:t>
+            </a:r>
+          </a:p>
+        </p:txBody>
+      </p:sp>
+      <p:sp>
+        <p:nvSpPr>
+          <p:cNvPr id="4" name="Slide Number Placeholder 3"/>
+          <p:cNvSpPr>
+            <a:spLocks noGrp="1"/>
+          </p:cNvSpPr>
+          <p:nvPr>
+            <p:ph type="sldNum" sz="quarter" idx="5"/>
+          </p:nvPr>
+        </p:nvSpPr>
+        <p:spPr/>
+        <p:txBody>
+          <a:bodyPr/>
+          <a:lstStyle/>
+          <a:p>
+            <a:fld id="{C6B88E8F-877C-440D-9740-4815E5BB05AA}" type="slidenum">
+              <a:rPr lang="en-US" smtClean="0"/>
+              <a:t>6</a:t>
+            </a:fld>
+            <a:endParaRPr lang="en-US"/>
+          </a:p>
+        </p:txBody>
+      </p:sp>
+    </p:spTree>
+    <p:extLst>
+      <p:ext uri="{BB962C8B-B14F-4D97-AF65-F5344CB8AC3E}">
+        <p14:creationId xmlns:p14="http://schemas.microsoft.com/office/powerpoint/2010/main" val="1302251736"/>
+      </p:ext>
+    </p:extLst>
+  </p:cSld>
+  <p:clrMapOvr>
+    <a:masterClrMapping/>
+  </p:clrMapOvr>
+</p:notes>
+</file>
+
+<file path=ppt/notesSlides/notesSlide6.xml><?xml version="1.0" encoding="utf-8"?>
+<p:notes xmlns:a="http://schemas.openxmlformats.org/drawingml/2006/main" xmlns:r="http://schemas.openxmlformats.org/officeDocument/2006/relationships" xmlns:p="http://schemas.openxmlformats.org/presentationml/2006/main">
+  <p:cSld>
+    <p:spTree>
+      <p:nvGrpSpPr>
+        <p:cNvPr id="1" name=""/>
+        <p:cNvGrpSpPr/>
+        <p:nvPr/>
+      </p:nvGrpSpPr>
+      <p:grpSpPr>
+        <a:xfrm>
+          <a:off x="0" y="0"/>
+          <a:ext cx="0" cy="0"/>
+          <a:chOff x="0" y="0"/>
+          <a:chExt cx="0" cy="0"/>
+        </a:xfrm>
+      </p:grpSpPr>
+      <p:sp>
+        <p:nvSpPr>
+          <p:cNvPr id="2" name="Slide Image Placeholder 1"/>
+          <p:cNvSpPr>
+            <a:spLocks noGrp="1" noRot="1" noChangeAspect="1"/>
+          </p:cNvSpPr>
+          <p:nvPr>
+            <p:ph type="sldImg"/>
+          </p:nvPr>
+        </p:nvSpPr>
+        <p:spPr/>
+      </p:sp>
+      <p:sp>
+        <p:nvSpPr>
+          <p:cNvPr id="3" name="Notes Placeholder 2"/>
+          <p:cNvSpPr>
+            <a:spLocks noGrp="1"/>
+          </p:cNvSpPr>
+          <p:nvPr>
+            <p:ph type="body" idx="1"/>
+          </p:nvPr>
+        </p:nvSpPr>
+        <p:spPr/>
+        <p:txBody>
+          <a:bodyPr/>
+          <a:lstStyle/>
+          <a:p>
+            <a:r>
+              <a:rPr lang="en-US" dirty="0"/>
+              <a:t>I did a little conditional filter on Top free apps and Top paid apps. </a:t>
+            </a:r>
+          </a:p>
+          <a:p>
+            <a:r>
+              <a:rPr lang="en-US" dirty="0"/>
+              <a:t>I was able to create a pie chart at one time using seaborn but instead I went to an outside source and implemented my code via csv to help me with this.  </a:t>
+            </a:r>
+          </a:p>
+          <a:p>
+            <a:r>
+              <a:rPr lang="en-US" dirty="0"/>
+              <a:t>These represent the 5 star </a:t>
+            </a:r>
+            <a:r>
+              <a:rPr lang="en-US" dirty="0" err="1"/>
+              <a:t>user_rating</a:t>
+            </a:r>
+            <a:r>
+              <a:rPr lang="en-US" dirty="0"/>
+              <a:t>, with the highest rating counts, of the top 100 free or paid apps. </a:t>
+            </a:r>
+          </a:p>
+          <a:p>
+            <a:endParaRPr lang="en-US" dirty="0"/>
+          </a:p>
+          <a:p>
+            <a:r>
+              <a:rPr lang="en-US" dirty="0"/>
+              <a:t>Not familiar with outside data visualization tools but I wanted to give it a try.  I have some data that a pie chart would be great for. </a:t>
+            </a:r>
+          </a:p>
+          <a:p>
+            <a:endParaRPr lang="en-US" dirty="0"/>
+          </a:p>
+          <a:p>
+            <a:r>
+              <a:rPr lang="en-US" dirty="0"/>
+              <a:t>So I went to </a:t>
+            </a:r>
+            <a:r>
+              <a:rPr lang="en-US" dirty="0" err="1"/>
+              <a:t>datawrapper</a:t>
+            </a:r>
+            <a:r>
+              <a:rPr lang="en-US" dirty="0"/>
+              <a:t> and inputted some .csv files</a:t>
+            </a:r>
+          </a:p>
+          <a:p>
+            <a:endParaRPr lang="en-US" dirty="0"/>
+          </a:p>
+          <a:p>
+            <a:endParaRPr lang="en-US" dirty="0"/>
+          </a:p>
+        </p:txBody>
+      </p:sp>
+      <p:sp>
+        <p:nvSpPr>
+          <p:cNvPr id="4" name="Slide Number Placeholder 3"/>
+          <p:cNvSpPr>
+            <a:spLocks noGrp="1"/>
+          </p:cNvSpPr>
+          <p:nvPr>
+            <p:ph type="sldNum" sz="quarter" idx="5"/>
+          </p:nvPr>
+        </p:nvSpPr>
+        <p:spPr/>
+        <p:txBody>
+          <a:bodyPr/>
+          <a:lstStyle/>
+          <a:p>
+            <a:fld id="{C6B88E8F-877C-440D-9740-4815E5BB05AA}" type="slidenum">
+              <a:rPr lang="en-US" smtClean="0"/>
+              <a:t>7</a:t>
             </a:fld>
             <a:endParaRPr lang="en-US"/>
           </a:p>
@@ -1247,6 +1569,13 @@
         <p:blipFill>
           <a:blip r:embed="rId2">
             <a:alphaModFix amt="30000"/>
+            <a:duotone>
+              <a:prstClr val="black"/>
+              <a:schemeClr val="tx2">
+                <a:tint val="45000"/>
+                <a:satMod val="400000"/>
+              </a:schemeClr>
+            </a:duotone>
             <a:extLst>
               <a:ext uri="{28A0092B-C50C-407E-A947-70E740481C1C}">
                 <a14:useLocalDpi xmlns:a14="http://schemas.microsoft.com/office/drawing/2010/main" val="0"/>
@@ -1269,7 +1598,7 @@
           <a:noFill/>
           <a:extLst>
             <a:ext uri="{909E8E84-426E-40dd-AFC4-6F175D3DCCD1}">
-              <a14:hiddenFill xmlns="" xmlns:a14="http://schemas.microsoft.com/office/drawing/2010/main">
+              <a14:hiddenFill xmlns:a14="http://schemas.microsoft.com/office/drawing/2010/main" xmlns="">
                 <a:solidFill>
                   <a:srgbClr val="FFFFFF"/>
                 </a:solidFill>
@@ -1297,9 +1626,8 @@
                 <a:schemeClr val="tx2"/>
               </a:gs>
               <a:gs pos="100000">
-                <a:schemeClr val="bg2">
-                  <a:lumMod val="60000"/>
-                  <a:lumOff val="40000"/>
+                <a:schemeClr val="tx2">
+                  <a:lumMod val="50000"/>
                 </a:schemeClr>
               </a:gs>
             </a:gsLst>
@@ -1329,7 +1657,7 @@
             </a:ln>
             <a:extLst>
               <a:ext uri="{91240B29-F687-4f45-9708-019B960494DF}">
-                <a14:hiddenLine xmlns="" xmlns:a14="http://schemas.microsoft.com/office/drawing/2010/main" w="9525">
+                <a14:hiddenLine xmlns:a14="http://schemas.microsoft.com/office/drawing/2010/main" xmlns="" w="9525">
                   <a:solidFill>
                     <a:srgbClr val="000000"/>
                   </a:solidFill>
@@ -1419,7 +1747,7 @@
             </a:ln>
             <a:extLst>
               <a:ext uri="{91240B29-F687-4f45-9708-019B960494DF}">
-                <a14:hiddenLine xmlns="" xmlns:a14="http://schemas.microsoft.com/office/drawing/2010/main" w="9525">
+                <a14:hiddenLine xmlns:a14="http://schemas.microsoft.com/office/drawing/2010/main" xmlns="" w="9525">
                   <a:solidFill>
                     <a:srgbClr val="000000"/>
                   </a:solidFill>
@@ -1509,7 +1837,7 @@
             </a:ln>
             <a:extLst>
               <a:ext uri="{91240B29-F687-4f45-9708-019B960494DF}">
-                <a14:hiddenLine xmlns="" xmlns:a14="http://schemas.microsoft.com/office/drawing/2010/main" w="9525">
+                <a14:hiddenLine xmlns:a14="http://schemas.microsoft.com/office/drawing/2010/main" xmlns="" w="9525">
                   <a:solidFill>
                     <a:srgbClr val="000000"/>
                   </a:solidFill>
@@ -1543,7 +1871,7 @@
             </a:ln>
             <a:extLst>
               <a:ext uri="{91240B29-F687-4f45-9708-019B960494DF}">
-                <a14:hiddenLine xmlns="" xmlns:a14="http://schemas.microsoft.com/office/drawing/2010/main" w="9525">
+                <a14:hiddenLine xmlns:a14="http://schemas.microsoft.com/office/drawing/2010/main" xmlns="" w="9525">
                   <a:solidFill>
                     <a:srgbClr val="000000"/>
                   </a:solidFill>
@@ -1633,7 +1961,7 @@
             </a:ln>
             <a:extLst>
               <a:ext uri="{91240B29-F687-4f45-9708-019B960494DF}">
-                <a14:hiddenLine xmlns="" xmlns:a14="http://schemas.microsoft.com/office/drawing/2010/main" w="9525">
+                <a14:hiddenLine xmlns:a14="http://schemas.microsoft.com/office/drawing/2010/main" xmlns="" w="9525">
                   <a:solidFill>
                     <a:srgbClr val="000000"/>
                   </a:solidFill>
@@ -1695,7 +2023,7 @@
             </a:ln>
             <a:extLst>
               <a:ext uri="{91240B29-F687-4f45-9708-019B960494DF}">
-                <a14:hiddenLine xmlns="" xmlns:a14="http://schemas.microsoft.com/office/drawing/2010/main" w="9525">
+                <a14:hiddenLine xmlns:a14="http://schemas.microsoft.com/office/drawing/2010/main" xmlns="" w="9525">
                   <a:solidFill>
                     <a:srgbClr val="000000"/>
                   </a:solidFill>
@@ -1757,7 +2085,7 @@
             </a:ln>
             <a:extLst>
               <a:ext uri="{91240B29-F687-4f45-9708-019B960494DF}">
-                <a14:hiddenLine xmlns="" xmlns:a14="http://schemas.microsoft.com/office/drawing/2010/main" w="9525">
+                <a14:hiddenLine xmlns:a14="http://schemas.microsoft.com/office/drawing/2010/main" xmlns="" w="9525">
                   <a:solidFill>
                     <a:srgbClr val="000000"/>
                   </a:solidFill>
@@ -1847,7 +2175,7 @@
             </a:ln>
             <a:extLst>
               <a:ext uri="{91240B29-F687-4f45-9708-019B960494DF}">
-                <a14:hiddenLine xmlns="" xmlns:a14="http://schemas.microsoft.com/office/drawing/2010/main" w="9525">
+                <a14:hiddenLine xmlns:a14="http://schemas.microsoft.com/office/drawing/2010/main" xmlns="" w="9525">
                   <a:solidFill>
                     <a:srgbClr val="000000"/>
                   </a:solidFill>
@@ -1909,7 +2237,7 @@
             </a:ln>
             <a:extLst>
               <a:ext uri="{91240B29-F687-4f45-9708-019B960494DF}">
-                <a14:hiddenLine xmlns="" xmlns:a14="http://schemas.microsoft.com/office/drawing/2010/main" w="9525">
+                <a14:hiddenLine xmlns:a14="http://schemas.microsoft.com/office/drawing/2010/main" xmlns="" w="9525">
                   <a:solidFill>
                     <a:srgbClr val="000000"/>
                   </a:solidFill>
@@ -1971,7 +2299,7 @@
             </a:ln>
             <a:extLst>
               <a:ext uri="{91240B29-F687-4f45-9708-019B960494DF}">
-                <a14:hiddenLine xmlns="" xmlns:a14="http://schemas.microsoft.com/office/drawing/2010/main" w="9525">
+                <a14:hiddenLine xmlns:a14="http://schemas.microsoft.com/office/drawing/2010/main" xmlns="" w="9525">
                   <a:solidFill>
                     <a:srgbClr val="000000"/>
                   </a:solidFill>
@@ -2061,7 +2389,7 @@
             </a:ln>
             <a:extLst>
               <a:ext uri="{91240B29-F687-4f45-9708-019B960494DF}">
-                <a14:hiddenLine xmlns="" xmlns:a14="http://schemas.microsoft.com/office/drawing/2010/main" w="9525">
+                <a14:hiddenLine xmlns:a14="http://schemas.microsoft.com/office/drawing/2010/main" xmlns="" w="9525">
                   <a:solidFill>
                     <a:srgbClr val="000000"/>
                   </a:solidFill>
@@ -2151,7 +2479,7 @@
             </a:ln>
             <a:extLst>
               <a:ext uri="{91240B29-F687-4f45-9708-019B960494DF}">
-                <a14:hiddenLine xmlns="" xmlns:a14="http://schemas.microsoft.com/office/drawing/2010/main" w="9525">
+                <a14:hiddenLine xmlns:a14="http://schemas.microsoft.com/office/drawing/2010/main" xmlns="" w="9525">
                   <a:solidFill>
                     <a:srgbClr val="000000"/>
                   </a:solidFill>
@@ -2213,7 +2541,7 @@
             </a:ln>
             <a:extLst>
               <a:ext uri="{91240B29-F687-4f45-9708-019B960494DF}">
-                <a14:hiddenLine xmlns="" xmlns:a14="http://schemas.microsoft.com/office/drawing/2010/main" w="9525">
+                <a14:hiddenLine xmlns:a14="http://schemas.microsoft.com/office/drawing/2010/main" xmlns="" w="9525">
                   <a:solidFill>
                     <a:srgbClr val="000000"/>
                   </a:solidFill>
@@ -2323,7 +2651,7 @@
             </a:ln>
             <a:extLst>
               <a:ext uri="{91240B29-F687-4f45-9708-019B960494DF}">
-                <a14:hiddenLine xmlns="" xmlns:a14="http://schemas.microsoft.com/office/drawing/2010/main" w="9525">
+                <a14:hiddenLine xmlns:a14="http://schemas.microsoft.com/office/drawing/2010/main" xmlns="" w="9525">
                   <a:solidFill>
                     <a:srgbClr val="000000"/>
                   </a:solidFill>
@@ -2385,7 +2713,7 @@
             </a:ln>
             <a:extLst>
               <a:ext uri="{91240B29-F687-4f45-9708-019B960494DF}">
-                <a14:hiddenLine xmlns="" xmlns:a14="http://schemas.microsoft.com/office/drawing/2010/main" w="9525">
+                <a14:hiddenLine xmlns:a14="http://schemas.microsoft.com/office/drawing/2010/main" xmlns="" w="9525">
                   <a:solidFill>
                     <a:srgbClr val="000000"/>
                   </a:solidFill>
@@ -2475,7 +2803,7 @@
             </a:ln>
             <a:extLst>
               <a:ext uri="{91240B29-F687-4f45-9708-019B960494DF}">
-                <a14:hiddenLine xmlns="" xmlns:a14="http://schemas.microsoft.com/office/drawing/2010/main" w="9525">
+                <a14:hiddenLine xmlns:a14="http://schemas.microsoft.com/office/drawing/2010/main" xmlns="" w="9525">
                   <a:solidFill>
                     <a:srgbClr val="000000"/>
                   </a:solidFill>
@@ -2565,7 +2893,7 @@
             </a:ln>
             <a:extLst>
               <a:ext uri="{91240B29-F687-4f45-9708-019B960494DF}">
-                <a14:hiddenLine xmlns="" xmlns:a14="http://schemas.microsoft.com/office/drawing/2010/main" w="9525">
+                <a14:hiddenLine xmlns:a14="http://schemas.microsoft.com/office/drawing/2010/main" xmlns="" w="9525">
                   <a:solidFill>
                     <a:srgbClr val="000000"/>
                   </a:solidFill>
@@ -2627,7 +2955,7 @@
             </a:ln>
             <a:extLst>
               <a:ext uri="{91240B29-F687-4f45-9708-019B960494DF}">
-                <a14:hiddenLine xmlns="" xmlns:a14="http://schemas.microsoft.com/office/drawing/2010/main" w="9525">
+                <a14:hiddenLine xmlns:a14="http://schemas.microsoft.com/office/drawing/2010/main" xmlns="" w="9525">
                   <a:solidFill>
                     <a:srgbClr val="000000"/>
                   </a:solidFill>
@@ -2717,7 +3045,7 @@
             </a:ln>
             <a:extLst>
               <a:ext uri="{91240B29-F687-4f45-9708-019B960494DF}">
-                <a14:hiddenLine xmlns="" xmlns:a14="http://schemas.microsoft.com/office/drawing/2010/main" w="9525">
+                <a14:hiddenLine xmlns:a14="http://schemas.microsoft.com/office/drawing/2010/main" xmlns="" w="9525">
                   <a:solidFill>
                     <a:srgbClr val="000000"/>
                   </a:solidFill>
@@ -2807,7 +3135,7 @@
             </a:ln>
             <a:extLst>
               <a:ext uri="{91240B29-F687-4f45-9708-019B960494DF}">
-                <a14:hiddenLine xmlns="" xmlns:a14="http://schemas.microsoft.com/office/drawing/2010/main" w="9525">
+                <a14:hiddenLine xmlns:a14="http://schemas.microsoft.com/office/drawing/2010/main" xmlns="" w="9525">
                   <a:solidFill>
                     <a:srgbClr val="000000"/>
                   </a:solidFill>
@@ -2863,7 +3191,7 @@
             </a:ln>
             <a:extLst>
               <a:ext uri="{91240B29-F687-4f45-9708-019B960494DF}">
-                <a14:hiddenLine xmlns="" xmlns:a14="http://schemas.microsoft.com/office/drawing/2010/main" w="9525">
+                <a14:hiddenLine xmlns:a14="http://schemas.microsoft.com/office/drawing/2010/main" xmlns="" w="9525">
                   <a:solidFill>
                     <a:srgbClr val="000000"/>
                   </a:solidFill>
@@ -2953,7 +3281,7 @@
             </a:ln>
             <a:extLst>
               <a:ext uri="{91240B29-F687-4f45-9708-019B960494DF}">
-                <a14:hiddenLine xmlns="" xmlns:a14="http://schemas.microsoft.com/office/drawing/2010/main" w="9525">
+                <a14:hiddenLine xmlns:a14="http://schemas.microsoft.com/office/drawing/2010/main" xmlns="" w="9525">
                   <a:solidFill>
                     <a:srgbClr val="000000"/>
                   </a:solidFill>
@@ -3009,7 +3337,7 @@
             </a:ln>
             <a:extLst>
               <a:ext uri="{91240B29-F687-4f45-9708-019B960494DF}">
-                <a14:hiddenLine xmlns="" xmlns:a14="http://schemas.microsoft.com/office/drawing/2010/main" w="9525">
+                <a14:hiddenLine xmlns:a14="http://schemas.microsoft.com/office/drawing/2010/main" xmlns="" w="9525">
                   <a:solidFill>
                     <a:srgbClr val="000000"/>
                   </a:solidFill>
@@ -3099,7 +3427,7 @@
             </a:ln>
             <a:extLst>
               <a:ext uri="{91240B29-F687-4f45-9708-019B960494DF}">
-                <a14:hiddenLine xmlns="" xmlns:a14="http://schemas.microsoft.com/office/drawing/2010/main" w="9525">
+                <a14:hiddenLine xmlns:a14="http://schemas.microsoft.com/office/drawing/2010/main" xmlns="" w="9525">
                   <a:solidFill>
                     <a:srgbClr val="000000"/>
                   </a:solidFill>
@@ -3167,7 +3495,7 @@
             </a:ln>
             <a:extLst>
               <a:ext uri="{91240B29-F687-4f45-9708-019B960494DF}">
-                <a14:hiddenLine xmlns="" xmlns:a14="http://schemas.microsoft.com/office/drawing/2010/main" w="9525">
+                <a14:hiddenLine xmlns:a14="http://schemas.microsoft.com/office/drawing/2010/main" xmlns="" w="9525">
                   <a:solidFill>
                     <a:srgbClr val="000000"/>
                   </a:solidFill>
@@ -3257,7 +3585,7 @@
             </a:ln>
             <a:extLst>
               <a:ext uri="{91240B29-F687-4f45-9708-019B960494DF}">
-                <a14:hiddenLine xmlns="" xmlns:a14="http://schemas.microsoft.com/office/drawing/2010/main" w="9525">
+                <a14:hiddenLine xmlns:a14="http://schemas.microsoft.com/office/drawing/2010/main" xmlns="" w="9525">
                   <a:solidFill>
                     <a:srgbClr val="000000"/>
                   </a:solidFill>
@@ -3325,7 +3653,7 @@
             </a:ln>
             <a:extLst>
               <a:ext uri="{91240B29-F687-4f45-9708-019B960494DF}">
-                <a14:hiddenLine xmlns="" xmlns:a14="http://schemas.microsoft.com/office/drawing/2010/main" w="9525">
+                <a14:hiddenLine xmlns:a14="http://schemas.microsoft.com/office/drawing/2010/main" xmlns="" w="9525">
                   <a:solidFill>
                     <a:srgbClr val="000000"/>
                   </a:solidFill>
@@ -3415,7 +3743,7 @@
             </a:ln>
             <a:extLst>
               <a:ext uri="{91240B29-F687-4f45-9708-019B960494DF}">
-                <a14:hiddenLine xmlns="" xmlns:a14="http://schemas.microsoft.com/office/drawing/2010/main" w="9525">
+                <a14:hiddenLine xmlns:a14="http://schemas.microsoft.com/office/drawing/2010/main" xmlns="" w="9525">
                   <a:solidFill>
                     <a:srgbClr val="000000"/>
                   </a:solidFill>
@@ -3449,7 +3777,7 @@
             </a:ln>
             <a:extLst>
               <a:ext uri="{91240B29-F687-4f45-9708-019B960494DF}">
-                <a14:hiddenLine xmlns="" xmlns:a14="http://schemas.microsoft.com/office/drawing/2010/main" w="9525">
+                <a14:hiddenLine xmlns:a14="http://schemas.microsoft.com/office/drawing/2010/main" xmlns="" w="9525">
                   <a:solidFill>
                     <a:srgbClr val="000000"/>
                   </a:solidFill>
@@ -3539,7 +3867,7 @@
             </a:ln>
             <a:extLst>
               <a:ext uri="{91240B29-F687-4f45-9708-019B960494DF}">
-                <a14:hiddenLine xmlns="" xmlns:a14="http://schemas.microsoft.com/office/drawing/2010/main" w="9525">
+                <a14:hiddenLine xmlns:a14="http://schemas.microsoft.com/office/drawing/2010/main" xmlns="" w="9525">
                   <a:solidFill>
                     <a:srgbClr val="000000"/>
                   </a:solidFill>
@@ -3601,7 +3929,7 @@
             </a:ln>
             <a:extLst>
               <a:ext uri="{91240B29-F687-4f45-9708-019B960494DF}">
-                <a14:hiddenLine xmlns="" xmlns:a14="http://schemas.microsoft.com/office/drawing/2010/main" w="9525">
+                <a14:hiddenLine xmlns:a14="http://schemas.microsoft.com/office/drawing/2010/main" xmlns="" w="9525">
                   <a:solidFill>
                     <a:srgbClr val="000000"/>
                   </a:solidFill>
@@ -3663,7 +3991,7 @@
             </a:ln>
             <a:extLst>
               <a:ext uri="{91240B29-F687-4f45-9708-019B960494DF}">
-                <a14:hiddenLine xmlns="" xmlns:a14="http://schemas.microsoft.com/office/drawing/2010/main" w="9525">
+                <a14:hiddenLine xmlns:a14="http://schemas.microsoft.com/office/drawing/2010/main" xmlns="" w="9525">
                   <a:solidFill>
                     <a:srgbClr val="000000"/>
                   </a:solidFill>
@@ -3753,7 +4081,7 @@
             </a:ln>
             <a:extLst>
               <a:ext uri="{91240B29-F687-4f45-9708-019B960494DF}">
-                <a14:hiddenLine xmlns="" xmlns:a14="http://schemas.microsoft.com/office/drawing/2010/main" w="9525">
+                <a14:hiddenLine xmlns:a14="http://schemas.microsoft.com/office/drawing/2010/main" xmlns="" w="9525">
                   <a:solidFill>
                     <a:srgbClr val="000000"/>
                   </a:solidFill>
@@ -3821,7 +4149,7 @@
             </a:ln>
             <a:extLst>
               <a:ext uri="{91240B29-F687-4f45-9708-019B960494DF}">
-                <a14:hiddenLine xmlns="" xmlns:a14="http://schemas.microsoft.com/office/drawing/2010/main" w="9525">
+                <a14:hiddenLine xmlns:a14="http://schemas.microsoft.com/office/drawing/2010/main" xmlns="" w="9525">
                   <a:solidFill>
                     <a:srgbClr val="000000"/>
                   </a:solidFill>
@@ -3883,7 +4211,7 @@
             </a:ln>
             <a:extLst>
               <a:ext uri="{91240B29-F687-4f45-9708-019B960494DF}">
-                <a14:hiddenLine xmlns="" xmlns:a14="http://schemas.microsoft.com/office/drawing/2010/main" w="9525">
+                <a14:hiddenLine xmlns:a14="http://schemas.microsoft.com/office/drawing/2010/main" xmlns="" w="9525">
                   <a:solidFill>
                     <a:srgbClr val="000000"/>
                   </a:solidFill>
@@ -3973,7 +4301,7 @@
             </a:ln>
             <a:extLst>
               <a:ext uri="{91240B29-F687-4f45-9708-019B960494DF}">
-                <a14:hiddenLine xmlns="" xmlns:a14="http://schemas.microsoft.com/office/drawing/2010/main" w="9525">
+                <a14:hiddenLine xmlns:a14="http://schemas.microsoft.com/office/drawing/2010/main" xmlns="" w="9525">
                   <a:solidFill>
                     <a:srgbClr val="000000"/>
                   </a:solidFill>
@@ -4035,7 +4363,7 @@
             </a:ln>
             <a:extLst>
               <a:ext uri="{91240B29-F687-4f45-9708-019B960494DF}">
-                <a14:hiddenLine xmlns="" xmlns:a14="http://schemas.microsoft.com/office/drawing/2010/main" w="9525">
+                <a14:hiddenLine xmlns:a14="http://schemas.microsoft.com/office/drawing/2010/main" xmlns="" w="9525">
                   <a:solidFill>
                     <a:srgbClr val="000000"/>
                   </a:solidFill>
@@ -4125,7 +4453,7 @@
             </a:ln>
             <a:extLst>
               <a:ext uri="{91240B29-F687-4f45-9708-019B960494DF}">
-                <a14:hiddenLine xmlns="" xmlns:a14="http://schemas.microsoft.com/office/drawing/2010/main" w="9525">
+                <a14:hiddenLine xmlns:a14="http://schemas.microsoft.com/office/drawing/2010/main" xmlns="" w="9525">
                   <a:solidFill>
                     <a:srgbClr val="000000"/>
                   </a:solidFill>
@@ -4187,7 +4515,7 @@
             </a:ln>
             <a:extLst>
               <a:ext uri="{91240B29-F687-4f45-9708-019B960494DF}">
-                <a14:hiddenLine xmlns="" xmlns:a14="http://schemas.microsoft.com/office/drawing/2010/main" w="9525">
+                <a14:hiddenLine xmlns:a14="http://schemas.microsoft.com/office/drawing/2010/main" xmlns="" w="9525">
                   <a:solidFill>
                     <a:srgbClr val="000000"/>
                   </a:solidFill>
@@ -4277,7 +4605,7 @@
             </a:ln>
             <a:extLst>
               <a:ext uri="{91240B29-F687-4f45-9708-019B960494DF}">
-                <a14:hiddenLine xmlns="" xmlns:a14="http://schemas.microsoft.com/office/drawing/2010/main" w="9525">
+                <a14:hiddenLine xmlns:a14="http://schemas.microsoft.com/office/drawing/2010/main" xmlns="" w="9525">
                   <a:solidFill>
                     <a:srgbClr val="000000"/>
                   </a:solidFill>
@@ -4311,7 +4639,7 @@
             </a:ln>
             <a:extLst>
               <a:ext uri="{91240B29-F687-4f45-9708-019B960494DF}">
-                <a14:hiddenLine xmlns="" xmlns:a14="http://schemas.microsoft.com/office/drawing/2010/main" w="9525">
+                <a14:hiddenLine xmlns:a14="http://schemas.microsoft.com/office/drawing/2010/main" xmlns="" w="9525">
                   <a:solidFill>
                     <a:srgbClr val="000000"/>
                   </a:solidFill>
@@ -4376,7 +4704,7 @@
             </a:ln>
             <a:extLst>
               <a:ext uri="{91240B29-F687-4f45-9708-019B960494DF}">
-                <a14:hiddenLine xmlns="" xmlns:a14="http://schemas.microsoft.com/office/drawing/2010/main" w="9525">
+                <a14:hiddenLine xmlns:a14="http://schemas.microsoft.com/office/drawing/2010/main" xmlns="" w="9525">
                   <a:solidFill>
                     <a:srgbClr val="000000"/>
                   </a:solidFill>
@@ -4466,7 +4794,7 @@
             </a:ln>
             <a:extLst>
               <a:ext uri="{91240B29-F687-4f45-9708-019B960494DF}">
-                <a14:hiddenLine xmlns="" xmlns:a14="http://schemas.microsoft.com/office/drawing/2010/main" w="9525">
+                <a14:hiddenLine xmlns:a14="http://schemas.microsoft.com/office/drawing/2010/main" xmlns="" w="9525">
                   <a:solidFill>
                     <a:srgbClr val="000000"/>
                   </a:solidFill>
@@ -4528,7 +4856,7 @@
             </a:ln>
             <a:extLst>
               <a:ext uri="{91240B29-F687-4f45-9708-019B960494DF}">
-                <a14:hiddenLine xmlns="" xmlns:a14="http://schemas.microsoft.com/office/drawing/2010/main" w="9525">
+                <a14:hiddenLine xmlns:a14="http://schemas.microsoft.com/office/drawing/2010/main" xmlns="" w="9525">
                   <a:solidFill>
                     <a:srgbClr val="000000"/>
                   </a:solidFill>
@@ -4618,7 +4946,7 @@
             </a:ln>
             <a:extLst>
               <a:ext uri="{91240B29-F687-4f45-9708-019B960494DF}">
-                <a14:hiddenLine xmlns="" xmlns:a14="http://schemas.microsoft.com/office/drawing/2010/main" w="9525">
+                <a14:hiddenLine xmlns:a14="http://schemas.microsoft.com/office/drawing/2010/main" xmlns="" w="9525">
                   <a:solidFill>
                     <a:srgbClr val="000000"/>
                   </a:solidFill>
@@ -4708,7 +5036,7 @@
             </a:ln>
             <a:extLst>
               <a:ext uri="{91240B29-F687-4f45-9708-019B960494DF}">
-                <a14:hiddenLine xmlns="" xmlns:a14="http://schemas.microsoft.com/office/drawing/2010/main" w="9525">
+                <a14:hiddenLine xmlns:a14="http://schemas.microsoft.com/office/drawing/2010/main" xmlns="" w="9525">
                   <a:solidFill>
                     <a:srgbClr val="000000"/>
                   </a:solidFill>
@@ -4773,7 +5101,7 @@
             </a:ln>
             <a:extLst>
               <a:ext uri="{91240B29-F687-4f45-9708-019B960494DF}">
-                <a14:hiddenLine xmlns="" xmlns:a14="http://schemas.microsoft.com/office/drawing/2010/main" w="9525">
+                <a14:hiddenLine xmlns:a14="http://schemas.microsoft.com/office/drawing/2010/main" xmlns="" w="9525">
                   <a:solidFill>
                     <a:srgbClr val="000000"/>
                   </a:solidFill>
@@ -4835,7 +5163,7 @@
             </a:ln>
             <a:extLst>
               <a:ext uri="{91240B29-F687-4f45-9708-019B960494DF}">
-                <a14:hiddenLine xmlns="" xmlns:a14="http://schemas.microsoft.com/office/drawing/2010/main" w="9525">
+                <a14:hiddenLine xmlns:a14="http://schemas.microsoft.com/office/drawing/2010/main" xmlns="" w="9525">
                   <a:solidFill>
                     <a:srgbClr val="000000"/>
                   </a:solidFill>
@@ -4925,7 +5253,7 @@
             </a:ln>
             <a:extLst>
               <a:ext uri="{91240B29-F687-4f45-9708-019B960494DF}">
-                <a14:hiddenLine xmlns="" xmlns:a14="http://schemas.microsoft.com/office/drawing/2010/main" w="9525">
+                <a14:hiddenLine xmlns:a14="http://schemas.microsoft.com/office/drawing/2010/main" xmlns="" w="9525">
                   <a:solidFill>
                     <a:srgbClr val="000000"/>
                   </a:solidFill>
@@ -5015,7 +5343,7 @@
             </a:ln>
             <a:extLst>
               <a:ext uri="{91240B29-F687-4f45-9708-019B960494DF}">
-                <a14:hiddenLine xmlns="" xmlns:a14="http://schemas.microsoft.com/office/drawing/2010/main" w="9525">
+                <a14:hiddenLine xmlns:a14="http://schemas.microsoft.com/office/drawing/2010/main" xmlns="" w="9525">
                   <a:solidFill>
                     <a:srgbClr val="000000"/>
                   </a:solidFill>
@@ -5077,7 +5405,7 @@
             </a:ln>
             <a:extLst>
               <a:ext uri="{91240B29-F687-4f45-9708-019B960494DF}">
-                <a14:hiddenLine xmlns="" xmlns:a14="http://schemas.microsoft.com/office/drawing/2010/main" w="9525">
+                <a14:hiddenLine xmlns:a14="http://schemas.microsoft.com/office/drawing/2010/main" xmlns="" w="9525">
                   <a:solidFill>
                     <a:srgbClr val="000000"/>
                   </a:solidFill>
@@ -5197,7 +5525,7 @@
             </a:ln>
             <a:extLst>
               <a:ext uri="{91240B29-F687-4f45-9708-019B960494DF}">
-                <a14:hiddenLine xmlns="" xmlns:a14="http://schemas.microsoft.com/office/drawing/2010/main" w="9525">
+                <a14:hiddenLine xmlns:a14="http://schemas.microsoft.com/office/drawing/2010/main" xmlns="" w="9525">
                   <a:solidFill>
                     <a:srgbClr val="000000"/>
                   </a:solidFill>
@@ -5265,7 +5593,7 @@
             </a:ln>
             <a:extLst>
               <a:ext uri="{91240B29-F687-4f45-9708-019B960494DF}">
-                <a14:hiddenLine xmlns="" xmlns:a14="http://schemas.microsoft.com/office/drawing/2010/main" w="9525">
+                <a14:hiddenLine xmlns:a14="http://schemas.microsoft.com/office/drawing/2010/main" xmlns="" w="9525">
                   <a:solidFill>
                     <a:srgbClr val="000000"/>
                   </a:solidFill>
@@ -5355,7 +5683,7 @@
             </a:ln>
             <a:extLst>
               <a:ext uri="{91240B29-F687-4f45-9708-019B960494DF}">
-                <a14:hiddenLine xmlns="" xmlns:a14="http://schemas.microsoft.com/office/drawing/2010/main" w="9525">
+                <a14:hiddenLine xmlns:a14="http://schemas.microsoft.com/office/drawing/2010/main" xmlns="" w="9525">
                   <a:solidFill>
                     <a:srgbClr val="000000"/>
                   </a:solidFill>
@@ -5556,7 +5884,7 @@
     </p:spTree>
     <p:extLst>
       <p:ext uri="{BB962C8B-B14F-4D97-AF65-F5344CB8AC3E}">
-        <p14:creationId xmlns:p14="http://schemas.microsoft.com/office/powerpoint/2010/main" val="2675735746"/>
+        <p14:creationId xmlns:p14="http://schemas.microsoft.com/office/powerpoint/2010/main" val="2709445504"/>
       </p:ext>
     </p:extLst>
   </p:cSld>
@@ -5813,7 +6141,7 @@
     </p:spTree>
     <p:extLst>
       <p:ext uri="{BB962C8B-B14F-4D97-AF65-F5344CB8AC3E}">
-        <p14:creationId xmlns:p14="http://schemas.microsoft.com/office/powerpoint/2010/main" val="1118487222"/>
+        <p14:creationId xmlns:p14="http://schemas.microsoft.com/office/powerpoint/2010/main" val="3197189558"/>
       </p:ext>
     </p:extLst>
   </p:cSld>
@@ -6009,7 +6337,7 @@
     </p:spTree>
     <p:extLst>
       <p:ext uri="{BB962C8B-B14F-4D97-AF65-F5344CB8AC3E}">
-        <p14:creationId xmlns:p14="http://schemas.microsoft.com/office/powerpoint/2010/main" val="3393486666"/>
+        <p14:creationId xmlns:p14="http://schemas.microsoft.com/office/powerpoint/2010/main" val="3062112187"/>
       </p:ext>
     </p:extLst>
   </p:cSld>
@@ -6510,7 +6838,7 @@
     </p:spTree>
     <p:extLst>
       <p:ext uri="{BB962C8B-B14F-4D97-AF65-F5344CB8AC3E}">
-        <p14:creationId xmlns:p14="http://schemas.microsoft.com/office/powerpoint/2010/main" val="3766296562"/>
+        <p14:creationId xmlns:p14="http://schemas.microsoft.com/office/powerpoint/2010/main" val="2943888818"/>
       </p:ext>
     </p:extLst>
   </p:cSld>
@@ -6706,7 +7034,7 @@
     </p:spTree>
     <p:extLst>
       <p:ext uri="{BB962C8B-B14F-4D97-AF65-F5344CB8AC3E}">
-        <p14:creationId xmlns:p14="http://schemas.microsoft.com/office/powerpoint/2010/main" val="718485373"/>
+        <p14:creationId xmlns:p14="http://schemas.microsoft.com/office/powerpoint/2010/main" val="2787442738"/>
       </p:ext>
     </p:extLst>
   </p:cSld>
@@ -7252,7 +7580,7 @@
     </p:spTree>
     <p:extLst>
       <p:ext uri="{BB962C8B-B14F-4D97-AF65-F5344CB8AC3E}">
-        <p14:creationId xmlns:p14="http://schemas.microsoft.com/office/powerpoint/2010/main" val="2075572887"/>
+        <p14:creationId xmlns:p14="http://schemas.microsoft.com/office/powerpoint/2010/main" val="2728959386"/>
       </p:ext>
     </p:extLst>
   </p:cSld>
@@ -7972,7 +8300,7 @@
     </p:spTree>
     <p:extLst>
       <p:ext uri="{BB962C8B-B14F-4D97-AF65-F5344CB8AC3E}">
-        <p14:creationId xmlns:p14="http://schemas.microsoft.com/office/powerpoint/2010/main" val="2734433637"/>
+        <p14:creationId xmlns:p14="http://schemas.microsoft.com/office/powerpoint/2010/main" val="3800777351"/>
       </p:ext>
     </p:extLst>
   </p:cSld>
@@ -8142,7 +8470,7 @@
     </p:spTree>
     <p:extLst>
       <p:ext uri="{BB962C8B-B14F-4D97-AF65-F5344CB8AC3E}">
-        <p14:creationId xmlns:p14="http://schemas.microsoft.com/office/powerpoint/2010/main" val="744860812"/>
+        <p14:creationId xmlns:p14="http://schemas.microsoft.com/office/powerpoint/2010/main" val="318544490"/>
       </p:ext>
     </p:extLst>
   </p:cSld>
@@ -8322,7 +8650,7 @@
     </p:spTree>
     <p:extLst>
       <p:ext uri="{BB962C8B-B14F-4D97-AF65-F5344CB8AC3E}">
-        <p14:creationId xmlns:p14="http://schemas.microsoft.com/office/powerpoint/2010/main" val="16712906"/>
+        <p14:creationId xmlns:p14="http://schemas.microsoft.com/office/powerpoint/2010/main" val="2556439397"/>
       </p:ext>
     </p:extLst>
   </p:cSld>
@@ -8492,7 +8820,7 @@
     </p:spTree>
     <p:extLst>
       <p:ext uri="{BB962C8B-B14F-4D97-AF65-F5344CB8AC3E}">
-        <p14:creationId xmlns:p14="http://schemas.microsoft.com/office/powerpoint/2010/main" val="1031574633"/>
+        <p14:creationId xmlns:p14="http://schemas.microsoft.com/office/powerpoint/2010/main" val="1799600327"/>
       </p:ext>
     </p:extLst>
   </p:cSld>
@@ -8742,7 +9070,7 @@
     </p:spTree>
     <p:extLst>
       <p:ext uri="{BB962C8B-B14F-4D97-AF65-F5344CB8AC3E}">
-        <p14:creationId xmlns:p14="http://schemas.microsoft.com/office/powerpoint/2010/main" val="2536370618"/>
+        <p14:creationId xmlns:p14="http://schemas.microsoft.com/office/powerpoint/2010/main" val="2953750479"/>
       </p:ext>
     </p:extLst>
   </p:cSld>
@@ -8974,7 +9302,7 @@
     </p:spTree>
     <p:extLst>
       <p:ext uri="{BB962C8B-B14F-4D97-AF65-F5344CB8AC3E}">
-        <p14:creationId xmlns:p14="http://schemas.microsoft.com/office/powerpoint/2010/main" val="3063552450"/>
+        <p14:creationId xmlns:p14="http://schemas.microsoft.com/office/powerpoint/2010/main" val="2754597274"/>
       </p:ext>
     </p:extLst>
   </p:cSld>
@@ -9355,7 +9683,7 @@
     </p:spTree>
     <p:extLst>
       <p:ext uri="{BB962C8B-B14F-4D97-AF65-F5344CB8AC3E}">
-        <p14:creationId xmlns:p14="http://schemas.microsoft.com/office/powerpoint/2010/main" val="1989453549"/>
+        <p14:creationId xmlns:p14="http://schemas.microsoft.com/office/powerpoint/2010/main" val="3177155973"/>
       </p:ext>
     </p:extLst>
   </p:cSld>
@@ -9473,7 +9801,7 @@
     </p:spTree>
     <p:extLst>
       <p:ext uri="{BB962C8B-B14F-4D97-AF65-F5344CB8AC3E}">
-        <p14:creationId xmlns:p14="http://schemas.microsoft.com/office/powerpoint/2010/main" val="2212336143"/>
+        <p14:creationId xmlns:p14="http://schemas.microsoft.com/office/powerpoint/2010/main" val="1727566206"/>
       </p:ext>
     </p:extLst>
   </p:cSld>
@@ -9568,7 +9896,7 @@
     </p:spTree>
     <p:extLst>
       <p:ext uri="{BB962C8B-B14F-4D97-AF65-F5344CB8AC3E}">
-        <p14:creationId xmlns:p14="http://schemas.microsoft.com/office/powerpoint/2010/main" val="3335200311"/>
+        <p14:creationId xmlns:p14="http://schemas.microsoft.com/office/powerpoint/2010/main" val="321694756"/>
       </p:ext>
     </p:extLst>
   </p:cSld>
@@ -9817,7 +10145,7 @@
     </p:spTree>
     <p:extLst>
       <p:ext uri="{BB962C8B-B14F-4D97-AF65-F5344CB8AC3E}">
-        <p14:creationId xmlns:p14="http://schemas.microsoft.com/office/powerpoint/2010/main" val="3454753153"/>
+        <p14:creationId xmlns:p14="http://schemas.microsoft.com/office/powerpoint/2010/main" val="809207996"/>
       </p:ext>
     </p:extLst>
   </p:cSld>
@@ -10097,7 +10425,7 @@
     </p:spTree>
     <p:extLst>
       <p:ext uri="{BB962C8B-B14F-4D97-AF65-F5344CB8AC3E}">
-        <p14:creationId xmlns:p14="http://schemas.microsoft.com/office/powerpoint/2010/main" val="913262883"/>
+        <p14:creationId xmlns:p14="http://schemas.microsoft.com/office/powerpoint/2010/main" val="1919138042"/>
       </p:ext>
     </p:extLst>
   </p:cSld>
@@ -10140,6 +10468,13 @@
         <p:blipFill>
           <a:blip r:embed="rId19">
             <a:alphaModFix amt="30000"/>
+            <a:duotone>
+              <a:prstClr val="black"/>
+              <a:schemeClr val="tx2">
+                <a:tint val="45000"/>
+                <a:satMod val="400000"/>
+              </a:schemeClr>
+            </a:duotone>
             <a:extLst>
               <a:ext uri="{28A0092B-C50C-407E-A947-70E740481C1C}">
                 <a14:useLocalDpi xmlns:a14="http://schemas.microsoft.com/office/drawing/2010/main" val="0"/>
@@ -10162,7 +10497,7 @@
           <a:noFill/>
           <a:extLst>
             <a:ext uri="{909E8E84-426E-40dd-AFC4-6F175D3DCCD1}">
-              <a14:hiddenFill xmlns="" xmlns:a14="http://schemas.microsoft.com/office/drawing/2010/main">
+              <a14:hiddenFill xmlns:a14="http://schemas.microsoft.com/office/drawing/2010/main" xmlns="">
                 <a:solidFill>
                   <a:srgbClr val="FFFFFF"/>
                 </a:solidFill>
@@ -10184,6 +10519,20 @@
             <a:chOff x="-14288" y="0"/>
             <a:chExt cx="12053888" cy="6858001"/>
           </a:xfrm>
+          <a:gradFill flip="none" rotWithShape="1">
+            <a:gsLst>
+              <a:gs pos="0">
+                <a:schemeClr val="tx2"/>
+              </a:gs>
+              <a:gs pos="100000">
+                <a:schemeClr val="tx2">
+                  <a:lumMod val="50000"/>
+                </a:schemeClr>
+              </a:gs>
+            </a:gsLst>
+            <a:lin ang="5400000" scaled="0"/>
+            <a:tileRect/>
+          </a:gradFill>
         </p:grpSpPr>
         <p:grpSp>
           <p:nvGrpSpPr>
@@ -10198,21 +10547,7 @@
               <a:chOff x="-14288" y="0"/>
               <a:chExt cx="1220788" cy="6858001"/>
             </a:xfrm>
-            <a:gradFill flip="none" rotWithShape="1">
-              <a:gsLst>
-                <a:gs pos="0">
-                  <a:schemeClr val="tx2"/>
-                </a:gs>
-                <a:gs pos="100000">
-                  <a:schemeClr val="bg2">
-                    <a:lumMod val="60000"/>
-                    <a:lumOff val="40000"/>
-                  </a:schemeClr>
-                </a:gs>
-              </a:gsLst>
-              <a:lin ang="5400000" scaled="0"/>
-              <a:tileRect/>
-            </a:gradFill>
+            <a:grpFill/>
           </p:grpSpPr>
           <p:sp>
             <p:nvSpPr>
@@ -10236,7 +10571,7 @@
               </a:ln>
               <a:extLst>
                 <a:ext uri="{91240B29-F687-4f45-9708-019B960494DF}">
-                  <a14:hiddenLine xmlns="" xmlns:a14="http://schemas.microsoft.com/office/drawing/2010/main" w="9525">
+                  <a14:hiddenLine xmlns:a14="http://schemas.microsoft.com/office/drawing/2010/main" xmlns="" w="9525">
                     <a:solidFill>
                       <a:srgbClr val="000000"/>
                     </a:solidFill>
@@ -10326,7 +10661,7 @@
               </a:ln>
               <a:extLst>
                 <a:ext uri="{91240B29-F687-4f45-9708-019B960494DF}">
-                  <a14:hiddenLine xmlns="" xmlns:a14="http://schemas.microsoft.com/office/drawing/2010/main" w="9525">
+                  <a14:hiddenLine xmlns:a14="http://schemas.microsoft.com/office/drawing/2010/main" xmlns="" w="9525">
                     <a:solidFill>
                       <a:srgbClr val="000000"/>
                     </a:solidFill>
@@ -10416,7 +10751,7 @@
               </a:ln>
               <a:extLst>
                 <a:ext uri="{91240B29-F687-4f45-9708-019B960494DF}">
-                  <a14:hiddenLine xmlns="" xmlns:a14="http://schemas.microsoft.com/office/drawing/2010/main" w="9525">
+                  <a14:hiddenLine xmlns:a14="http://schemas.microsoft.com/office/drawing/2010/main" xmlns="" w="9525">
                     <a:solidFill>
                       <a:srgbClr val="000000"/>
                     </a:solidFill>
@@ -10478,7 +10813,7 @@
               </a:ln>
               <a:extLst>
                 <a:ext uri="{91240B29-F687-4f45-9708-019B960494DF}">
-                  <a14:hiddenLine xmlns="" xmlns:a14="http://schemas.microsoft.com/office/drawing/2010/main" w="9525">
+                  <a14:hiddenLine xmlns:a14="http://schemas.microsoft.com/office/drawing/2010/main" xmlns="" w="9525">
                     <a:solidFill>
                       <a:srgbClr val="000000"/>
                     </a:solidFill>
@@ -10568,7 +10903,7 @@
               </a:ln>
               <a:extLst>
                 <a:ext uri="{91240B29-F687-4f45-9708-019B960494DF}">
-                  <a14:hiddenLine xmlns="" xmlns:a14="http://schemas.microsoft.com/office/drawing/2010/main" w="9525">
+                  <a14:hiddenLine xmlns:a14="http://schemas.microsoft.com/office/drawing/2010/main" xmlns="" w="9525">
                     <a:solidFill>
                       <a:srgbClr val="000000"/>
                     </a:solidFill>
@@ -10630,7 +10965,7 @@
               </a:ln>
               <a:extLst>
                 <a:ext uri="{91240B29-F687-4f45-9708-019B960494DF}">
-                  <a14:hiddenLine xmlns="" xmlns:a14="http://schemas.microsoft.com/office/drawing/2010/main" w="9525">
+                  <a14:hiddenLine xmlns:a14="http://schemas.microsoft.com/office/drawing/2010/main" xmlns="" w="9525">
                     <a:solidFill>
                       <a:srgbClr val="000000"/>
                     </a:solidFill>
@@ -10692,7 +11027,7 @@
               </a:ln>
               <a:extLst>
                 <a:ext uri="{91240B29-F687-4f45-9708-019B960494DF}">
-                  <a14:hiddenLine xmlns="" xmlns:a14="http://schemas.microsoft.com/office/drawing/2010/main" w="9525">
+                  <a14:hiddenLine xmlns:a14="http://schemas.microsoft.com/office/drawing/2010/main" xmlns="" w="9525">
                     <a:solidFill>
                       <a:srgbClr val="000000"/>
                     </a:solidFill>
@@ -10782,7 +11117,7 @@
               </a:ln>
               <a:extLst>
                 <a:ext uri="{91240B29-F687-4f45-9708-019B960494DF}">
-                  <a14:hiddenLine xmlns="" xmlns:a14="http://schemas.microsoft.com/office/drawing/2010/main" w="9525">
+                  <a14:hiddenLine xmlns:a14="http://schemas.microsoft.com/office/drawing/2010/main" xmlns="" w="9525">
                     <a:solidFill>
                       <a:srgbClr val="000000"/>
                     </a:solidFill>
@@ -10872,7 +11207,7 @@
               </a:ln>
               <a:extLst>
                 <a:ext uri="{91240B29-F687-4f45-9708-019B960494DF}">
-                  <a14:hiddenLine xmlns="" xmlns:a14="http://schemas.microsoft.com/office/drawing/2010/main" w="9525">
+                  <a14:hiddenLine xmlns:a14="http://schemas.microsoft.com/office/drawing/2010/main" xmlns="" w="9525">
                     <a:solidFill>
                       <a:srgbClr val="000000"/>
                     </a:solidFill>
@@ -10934,7 +11269,7 @@
               </a:ln>
               <a:extLst>
                 <a:ext uri="{91240B29-F687-4f45-9708-019B960494DF}">
-                  <a14:hiddenLine xmlns="" xmlns:a14="http://schemas.microsoft.com/office/drawing/2010/main" w="9525">
+                  <a14:hiddenLine xmlns:a14="http://schemas.microsoft.com/office/drawing/2010/main" xmlns="" w="9525">
                     <a:solidFill>
                       <a:srgbClr val="000000"/>
                     </a:solidFill>
@@ -11044,7 +11379,7 @@
               </a:ln>
               <a:extLst>
                 <a:ext uri="{91240B29-F687-4f45-9708-019B960494DF}">
-                  <a14:hiddenLine xmlns="" xmlns:a14="http://schemas.microsoft.com/office/drawing/2010/main" w="9525">
+                  <a14:hiddenLine xmlns:a14="http://schemas.microsoft.com/office/drawing/2010/main" xmlns="" w="9525">
                     <a:solidFill>
                       <a:srgbClr val="000000"/>
                     </a:solidFill>
@@ -11128,7 +11463,7 @@
               </a:ln>
               <a:extLst>
                 <a:ext uri="{91240B29-F687-4f45-9708-019B960494DF}">
-                  <a14:hiddenLine xmlns="" xmlns:a14="http://schemas.microsoft.com/office/drawing/2010/main" w="9525">
+                  <a14:hiddenLine xmlns:a14="http://schemas.microsoft.com/office/drawing/2010/main" xmlns="" w="9525">
                     <a:solidFill>
                       <a:srgbClr val="000000"/>
                     </a:solidFill>
@@ -11190,7 +11525,7 @@
               </a:ln>
               <a:extLst>
                 <a:ext uri="{91240B29-F687-4f45-9708-019B960494DF}">
-                  <a14:hiddenLine xmlns="" xmlns:a14="http://schemas.microsoft.com/office/drawing/2010/main" w="9525">
+                  <a14:hiddenLine xmlns:a14="http://schemas.microsoft.com/office/drawing/2010/main" xmlns="" w="9525">
                     <a:solidFill>
                       <a:srgbClr val="000000"/>
                     </a:solidFill>
@@ -11252,7 +11587,7 @@
               </a:ln>
               <a:extLst>
                 <a:ext uri="{91240B29-F687-4f45-9708-019B960494DF}">
-                  <a14:hiddenLine xmlns="" xmlns:a14="http://schemas.microsoft.com/office/drawing/2010/main" w="9525">
+                  <a14:hiddenLine xmlns:a14="http://schemas.microsoft.com/office/drawing/2010/main" xmlns="" w="9525">
                     <a:solidFill>
                       <a:srgbClr val="000000"/>
                     </a:solidFill>
@@ -11342,7 +11677,7 @@
               </a:ln>
               <a:extLst>
                 <a:ext uri="{91240B29-F687-4f45-9708-019B960494DF}">
-                  <a14:hiddenLine xmlns="" xmlns:a14="http://schemas.microsoft.com/office/drawing/2010/main" w="9525">
+                  <a14:hiddenLine xmlns:a14="http://schemas.microsoft.com/office/drawing/2010/main" xmlns="" w="9525">
                     <a:solidFill>
                       <a:srgbClr val="000000"/>
                     </a:solidFill>
@@ -11376,7 +11711,7 @@
               </a:ln>
               <a:extLst>
                 <a:ext uri="{91240B29-F687-4f45-9708-019B960494DF}">
-                  <a14:hiddenLine xmlns="" xmlns:a14="http://schemas.microsoft.com/office/drawing/2010/main" w="9525">
+                  <a14:hiddenLine xmlns:a14="http://schemas.microsoft.com/office/drawing/2010/main" xmlns="" w="9525">
                     <a:solidFill>
                       <a:srgbClr val="000000"/>
                     </a:solidFill>
@@ -11441,7 +11776,7 @@
               </a:ln>
               <a:extLst>
                 <a:ext uri="{91240B29-F687-4f45-9708-019B960494DF}">
-                  <a14:hiddenLine xmlns="" xmlns:a14="http://schemas.microsoft.com/office/drawing/2010/main" w="9525">
+                  <a14:hiddenLine xmlns:a14="http://schemas.microsoft.com/office/drawing/2010/main" xmlns="" w="9525">
                     <a:solidFill>
                       <a:srgbClr val="000000"/>
                     </a:solidFill>
@@ -11531,7 +11866,7 @@
               </a:ln>
               <a:extLst>
                 <a:ext uri="{91240B29-F687-4f45-9708-019B960494DF}">
-                  <a14:hiddenLine xmlns="" xmlns:a14="http://schemas.microsoft.com/office/drawing/2010/main" w="9525">
+                  <a14:hiddenLine xmlns:a14="http://schemas.microsoft.com/office/drawing/2010/main" xmlns="" w="9525">
                     <a:solidFill>
                       <a:srgbClr val="000000"/>
                     </a:solidFill>
@@ -11593,7 +11928,7 @@
               </a:ln>
               <a:extLst>
                 <a:ext uri="{91240B29-F687-4f45-9708-019B960494DF}">
-                  <a14:hiddenLine xmlns="" xmlns:a14="http://schemas.microsoft.com/office/drawing/2010/main" w="9525">
+                  <a14:hiddenLine xmlns:a14="http://schemas.microsoft.com/office/drawing/2010/main" xmlns="" w="9525">
                     <a:solidFill>
                       <a:srgbClr val="000000"/>
                     </a:solidFill>
@@ -11683,7 +12018,7 @@
               </a:ln>
               <a:extLst>
                 <a:ext uri="{91240B29-F687-4f45-9708-019B960494DF}">
-                  <a14:hiddenLine xmlns="" xmlns:a14="http://schemas.microsoft.com/office/drawing/2010/main" w="9525">
+                  <a14:hiddenLine xmlns:a14="http://schemas.microsoft.com/office/drawing/2010/main" xmlns="" w="9525">
                     <a:solidFill>
                       <a:srgbClr val="000000"/>
                     </a:solidFill>
@@ -11748,7 +12083,7 @@
               </a:ln>
               <a:extLst>
                 <a:ext uri="{91240B29-F687-4f45-9708-019B960494DF}">
-                  <a14:hiddenLine xmlns="" xmlns:a14="http://schemas.microsoft.com/office/drawing/2010/main" w="9525">
+                  <a14:hiddenLine xmlns:a14="http://schemas.microsoft.com/office/drawing/2010/main" xmlns="" w="9525">
                     <a:solidFill>
                       <a:srgbClr val="000000"/>
                     </a:solidFill>
@@ -11810,7 +12145,7 @@
               </a:ln>
               <a:extLst>
                 <a:ext uri="{91240B29-F687-4f45-9708-019B960494DF}">
-                  <a14:hiddenLine xmlns="" xmlns:a14="http://schemas.microsoft.com/office/drawing/2010/main" w="9525">
+                  <a14:hiddenLine xmlns:a14="http://schemas.microsoft.com/office/drawing/2010/main" xmlns="" w="9525">
                     <a:solidFill>
                       <a:srgbClr val="000000"/>
                     </a:solidFill>
@@ -11900,7 +12235,7 @@
               </a:ln>
               <a:extLst>
                 <a:ext uri="{91240B29-F687-4f45-9708-019B960494DF}">
-                  <a14:hiddenLine xmlns="" xmlns:a14="http://schemas.microsoft.com/office/drawing/2010/main" w="9525">
+                  <a14:hiddenLine xmlns:a14="http://schemas.microsoft.com/office/drawing/2010/main" xmlns="" w="9525">
                     <a:solidFill>
                       <a:srgbClr val="000000"/>
                     </a:solidFill>
@@ -11990,7 +12325,7 @@
               </a:ln>
               <a:extLst>
                 <a:ext uri="{91240B29-F687-4f45-9708-019B960494DF}">
-                  <a14:hiddenLine xmlns="" xmlns:a14="http://schemas.microsoft.com/office/drawing/2010/main" w="9525">
+                  <a14:hiddenLine xmlns:a14="http://schemas.microsoft.com/office/drawing/2010/main" xmlns="" w="9525">
                     <a:solidFill>
                       <a:srgbClr val="000000"/>
                     </a:solidFill>
@@ -12055,7 +12390,7 @@
               </a:ln>
               <a:extLst>
                 <a:ext uri="{91240B29-F687-4f45-9708-019B960494DF}">
-                  <a14:hiddenLine xmlns="" xmlns:a14="http://schemas.microsoft.com/office/drawing/2010/main" w="9525">
+                  <a14:hiddenLine xmlns:a14="http://schemas.microsoft.com/office/drawing/2010/main" xmlns="" w="9525">
                     <a:solidFill>
                       <a:srgbClr val="000000"/>
                     </a:solidFill>
@@ -12175,7 +12510,7 @@
               </a:ln>
               <a:extLst>
                 <a:ext uri="{91240B29-F687-4f45-9708-019B960494DF}">
-                  <a14:hiddenLine xmlns="" xmlns:a14="http://schemas.microsoft.com/office/drawing/2010/main" w="9525">
+                  <a14:hiddenLine xmlns:a14="http://schemas.microsoft.com/office/drawing/2010/main" xmlns="" w="9525">
                     <a:solidFill>
                       <a:srgbClr val="000000"/>
                     </a:solidFill>
@@ -12201,24 +12536,7 @@
               <a:chOff x="11364912" y="0"/>
               <a:chExt cx="674688" cy="6848476"/>
             </a:xfrm>
-            <a:gradFill flip="none" rotWithShape="1">
-              <a:gsLst>
-                <a:gs pos="0">
-                  <a:schemeClr val="tx2">
-                    <a:alpha val="80000"/>
-                  </a:schemeClr>
-                </a:gs>
-                <a:gs pos="100000">
-                  <a:schemeClr val="bg2">
-                    <a:lumMod val="60000"/>
-                    <a:lumOff val="40000"/>
-                    <a:alpha val="60000"/>
-                  </a:schemeClr>
-                </a:gs>
-              </a:gsLst>
-              <a:lin ang="5400000" scaled="0"/>
-              <a:tileRect/>
-            </a:gradFill>
+            <a:grpFill/>
           </p:grpSpPr>
           <p:sp>
             <p:nvSpPr>
@@ -12273,7 +12591,7 @@
               </a:ln>
               <a:extLst>
                 <a:ext uri="{91240B29-F687-4f45-9708-019B960494DF}">
-                  <a14:hiddenLine xmlns="" xmlns:a14="http://schemas.microsoft.com/office/drawing/2010/main" w="9525">
+                  <a14:hiddenLine xmlns:a14="http://schemas.microsoft.com/office/drawing/2010/main" xmlns="" w="9525">
                     <a:solidFill>
                       <a:srgbClr val="000000"/>
                     </a:solidFill>
@@ -12388,7 +12706,7 @@
               </a:ln>
               <a:extLst>
                 <a:ext uri="{91240B29-F687-4f45-9708-019B960494DF}">
-                  <a14:hiddenLine xmlns="" xmlns:a14="http://schemas.microsoft.com/office/drawing/2010/main" w="9525">
+                  <a14:hiddenLine xmlns:a14="http://schemas.microsoft.com/office/drawing/2010/main" xmlns="" w="9525">
                     <a:solidFill>
                       <a:srgbClr val="000000"/>
                     </a:solidFill>
@@ -12478,7 +12796,7 @@
               </a:ln>
               <a:extLst>
                 <a:ext uri="{91240B29-F687-4f45-9708-019B960494DF}">
-                  <a14:hiddenLine xmlns="" xmlns:a14="http://schemas.microsoft.com/office/drawing/2010/main" w="9525">
+                  <a14:hiddenLine xmlns:a14="http://schemas.microsoft.com/office/drawing/2010/main" xmlns="" w="9525">
                     <a:solidFill>
                       <a:srgbClr val="000000"/>
                     </a:solidFill>
@@ -12543,7 +12861,7 @@
               </a:ln>
               <a:extLst>
                 <a:ext uri="{91240B29-F687-4f45-9708-019B960494DF}">
-                  <a14:hiddenLine xmlns="" xmlns:a14="http://schemas.microsoft.com/office/drawing/2010/main" w="9525">
+                  <a14:hiddenLine xmlns:a14="http://schemas.microsoft.com/office/drawing/2010/main" xmlns="" w="9525">
                     <a:solidFill>
                       <a:srgbClr val="000000"/>
                     </a:solidFill>
@@ -12633,7 +12951,7 @@
               </a:ln>
               <a:extLst>
                 <a:ext uri="{91240B29-F687-4f45-9708-019B960494DF}">
-                  <a14:hiddenLine xmlns="" xmlns:a14="http://schemas.microsoft.com/office/drawing/2010/main" w="9525">
+                  <a14:hiddenLine xmlns:a14="http://schemas.microsoft.com/office/drawing/2010/main" xmlns="" w="9525">
                     <a:solidFill>
                       <a:srgbClr val="000000"/>
                     </a:solidFill>
@@ -12701,7 +13019,7 @@
               </a:ln>
               <a:extLst>
                 <a:ext uri="{91240B29-F687-4f45-9708-019B960494DF}">
-                  <a14:hiddenLine xmlns="" xmlns:a14="http://schemas.microsoft.com/office/drawing/2010/main" w="9525">
+                  <a14:hiddenLine xmlns:a14="http://schemas.microsoft.com/office/drawing/2010/main" xmlns="" w="9525">
                     <a:solidFill>
                       <a:srgbClr val="000000"/>
                     </a:solidFill>
@@ -12791,7 +13109,7 @@
               </a:ln>
               <a:extLst>
                 <a:ext uri="{91240B29-F687-4f45-9708-019B960494DF}">
-                  <a14:hiddenLine xmlns="" xmlns:a14="http://schemas.microsoft.com/office/drawing/2010/main" w="9525">
+                  <a14:hiddenLine xmlns:a14="http://schemas.microsoft.com/office/drawing/2010/main" xmlns="" w="9525">
                     <a:solidFill>
                       <a:srgbClr val="000000"/>
                     </a:solidFill>
@@ -12859,7 +13177,7 @@
               </a:ln>
               <a:extLst>
                 <a:ext uri="{91240B29-F687-4f45-9708-019B960494DF}">
-                  <a14:hiddenLine xmlns="" xmlns:a14="http://schemas.microsoft.com/office/drawing/2010/main" w="9525">
+                  <a14:hiddenLine xmlns:a14="http://schemas.microsoft.com/office/drawing/2010/main" xmlns="" w="9525">
                     <a:solidFill>
                       <a:srgbClr val="000000"/>
                     </a:solidFill>
@@ -12949,7 +13267,7 @@
               </a:ln>
               <a:extLst>
                 <a:ext uri="{91240B29-F687-4f45-9708-019B960494DF}">
-                  <a14:hiddenLine xmlns="" xmlns:a14="http://schemas.microsoft.com/office/drawing/2010/main" w="9525">
+                  <a14:hiddenLine xmlns:a14="http://schemas.microsoft.com/office/drawing/2010/main" xmlns="" w="9525">
                     <a:solidFill>
                       <a:srgbClr val="000000"/>
                     </a:solidFill>
@@ -12983,7 +13301,7 @@
               </a:ln>
               <a:extLst>
                 <a:ext uri="{91240B29-F687-4f45-9708-019B960494DF}">
-                  <a14:hiddenLine xmlns="" xmlns:a14="http://schemas.microsoft.com/office/drawing/2010/main" w="9525">
+                  <a14:hiddenLine xmlns:a14="http://schemas.microsoft.com/office/drawing/2010/main" xmlns="" w="9525">
                     <a:solidFill>
                       <a:srgbClr val="000000"/>
                     </a:solidFill>
@@ -13210,29 +13528,29 @@
     </p:spTree>
     <p:extLst>
       <p:ext uri="{BB962C8B-B14F-4D97-AF65-F5344CB8AC3E}">
-        <p14:creationId xmlns:p14="http://schemas.microsoft.com/office/powerpoint/2010/main" val="2144449641"/>
+        <p14:creationId xmlns:p14="http://schemas.microsoft.com/office/powerpoint/2010/main" val="2579182824"/>
       </p:ext>
     </p:extLst>
   </p:cSld>
   <p:clrMap bg1="dk1" tx1="lt1" bg2="dk2" tx2="lt2" accent1="accent1" accent2="accent2" accent3="accent3" accent4="accent4" accent5="accent5" accent6="accent6" hlink="hlink" folHlink="folHlink"/>
   <p:sldLayoutIdLst>
-    <p:sldLayoutId id="2147483661" r:id="rId1"/>
-    <p:sldLayoutId id="2147483662" r:id="rId2"/>
-    <p:sldLayoutId id="2147483663" r:id="rId3"/>
-    <p:sldLayoutId id="2147483664" r:id="rId4"/>
-    <p:sldLayoutId id="2147483665" r:id="rId5"/>
-    <p:sldLayoutId id="2147483666" r:id="rId6"/>
-    <p:sldLayoutId id="2147483667" r:id="rId7"/>
-    <p:sldLayoutId id="2147483668" r:id="rId8"/>
-    <p:sldLayoutId id="2147483669" r:id="rId9"/>
-    <p:sldLayoutId id="2147483670" r:id="rId10"/>
-    <p:sldLayoutId id="2147483671" r:id="rId11"/>
-    <p:sldLayoutId id="2147483672" r:id="rId12"/>
-    <p:sldLayoutId id="2147483673" r:id="rId13"/>
-    <p:sldLayoutId id="2147483674" r:id="rId14"/>
-    <p:sldLayoutId id="2147483675" r:id="rId15"/>
-    <p:sldLayoutId id="2147483676" r:id="rId16"/>
-    <p:sldLayoutId id="2147483677" r:id="rId17"/>
+    <p:sldLayoutId id="2147483679" r:id="rId1"/>
+    <p:sldLayoutId id="2147483680" r:id="rId2"/>
+    <p:sldLayoutId id="2147483681" r:id="rId3"/>
+    <p:sldLayoutId id="2147483682" r:id="rId4"/>
+    <p:sldLayoutId id="2147483683" r:id="rId5"/>
+    <p:sldLayoutId id="2147483684" r:id="rId6"/>
+    <p:sldLayoutId id="2147483685" r:id="rId7"/>
+    <p:sldLayoutId id="2147483686" r:id="rId8"/>
+    <p:sldLayoutId id="2147483687" r:id="rId9"/>
+    <p:sldLayoutId id="2147483688" r:id="rId10"/>
+    <p:sldLayoutId id="2147483689" r:id="rId11"/>
+    <p:sldLayoutId id="2147483690" r:id="rId12"/>
+    <p:sldLayoutId id="2147483691" r:id="rId13"/>
+    <p:sldLayoutId id="2147483692" r:id="rId14"/>
+    <p:sldLayoutId id="2147483693" r:id="rId15"/>
+    <p:sldLayoutId id="2147483694" r:id="rId16"/>
+    <p:sldLayoutId id="2147483695" r:id="rId17"/>
   </p:sldLayoutIdLst>
   <p:txStyles>
     <p:titleStyle>
@@ -13600,16 +13918,37 @@
           <a:lstStyle/>
           <a:p>
             <a:r>
-              <a:rPr lang="en-US" dirty="0"/>
+              <a:rPr lang="en-US" dirty="0">
+                <a:solidFill>
+                  <a:schemeClr val="tx2">
+                    <a:lumMod val="40000"/>
+                    <a:lumOff val="60000"/>
+                  </a:schemeClr>
+                </a:solidFill>
+              </a:rPr>
               <a:t>Analyzing Apple App statistics collected from July 2017. </a:t>
             </a:r>
           </a:p>
           <a:p>
-            <a:endParaRPr lang="en-US" dirty="0"/>
-          </a:p>
-          <a:p>
-            <a:r>
-              <a:rPr lang="en-US" dirty="0"/>
+            <a:endParaRPr lang="en-US" dirty="0">
+              <a:solidFill>
+                <a:schemeClr val="tx2">
+                  <a:lumMod val="40000"/>
+                  <a:lumOff val="60000"/>
+                </a:schemeClr>
+              </a:solidFill>
+            </a:endParaRPr>
+          </a:p>
+          <a:p>
+            <a:r>
+              <a:rPr lang="en-US" dirty="0">
+                <a:solidFill>
+                  <a:schemeClr val="tx2">
+                    <a:lumMod val="40000"/>
+                    <a:lumOff val="60000"/>
+                  </a:schemeClr>
+                </a:solidFill>
+              </a:rPr>
               <a:t>Source: </a:t>
             </a:r>
             <a:r>
@@ -13622,13 +13961,27 @@
           </a:p>
           <a:p>
             <a:r>
-              <a:rPr lang="en-US" dirty="0"/>
+              <a:rPr lang="en-US" dirty="0">
+                <a:solidFill>
+                  <a:schemeClr val="tx2">
+                    <a:lumMod val="40000"/>
+                    <a:lumOff val="60000"/>
+                  </a:schemeClr>
+                </a:solidFill>
+              </a:rPr>
               <a:t>Collection Date July 2017</a:t>
             </a:r>
           </a:p>
           <a:p>
             <a:r>
-              <a:rPr lang="en-US" dirty="0"/>
+              <a:rPr lang="en-US" dirty="0">
+                <a:solidFill>
+                  <a:schemeClr val="tx2">
+                    <a:lumMod val="40000"/>
+                    <a:lumOff val="60000"/>
+                  </a:schemeClr>
+                </a:solidFill>
+              </a:rPr>
               <a:t>Technologies Used: Pandas, Matplotlib, Seaborn</a:t>
             </a:r>
           </a:p>
@@ -13651,6 +14004,1079 @@
 </file>
 
 <file path=ppt/slides/slide10.xml><?xml version="1.0" encoding="utf-8"?>
+<p:sld xmlns:a="http://schemas.openxmlformats.org/drawingml/2006/main" xmlns:r="http://schemas.openxmlformats.org/officeDocument/2006/relationships" xmlns:p="http://schemas.openxmlformats.org/presentationml/2006/main">
+  <p:cSld>
+    <p:spTree>
+      <p:nvGrpSpPr>
+        <p:cNvPr id="1" name=""/>
+        <p:cNvGrpSpPr/>
+        <p:nvPr/>
+      </p:nvGrpSpPr>
+      <p:grpSpPr>
+        <a:xfrm>
+          <a:off x="0" y="0"/>
+          <a:ext cx="0" cy="0"/>
+          <a:chOff x="0" y="0"/>
+          <a:chExt cx="0" cy="0"/>
+        </a:xfrm>
+      </p:grpSpPr>
+      <p:sp>
+        <p:nvSpPr>
+          <p:cNvPr id="2" name="Title 1">
+            <a:extLst>
+              <a:ext uri="{FF2B5EF4-FFF2-40B4-BE49-F238E27FC236}">
+                <a16:creationId xmlns:a16="http://schemas.microsoft.com/office/drawing/2014/main" id="{2C20C299-2256-424F-A895-44204C068478}"/>
+              </a:ext>
+            </a:extLst>
+          </p:cNvPr>
+          <p:cNvSpPr>
+            <a:spLocks noGrp="1"/>
+          </p:cNvSpPr>
+          <p:nvPr>
+            <p:ph type="title"/>
+          </p:nvPr>
+        </p:nvSpPr>
+        <p:spPr>
+          <a:xfrm>
+            <a:off x="1141411" y="1419227"/>
+            <a:ext cx="9906000" cy="1496166"/>
+          </a:xfrm>
+        </p:spPr>
+        <p:txBody>
+          <a:bodyPr/>
+          <a:lstStyle/>
+          <a:p>
+            <a:r>
+              <a:rPr lang="en-US" dirty="0"/>
+              <a:t>Further research…</a:t>
+            </a:r>
+          </a:p>
+        </p:txBody>
+      </p:sp>
+      <p:sp>
+        <p:nvSpPr>
+          <p:cNvPr id="3" name="Text Placeholder 2">
+            <a:extLst>
+              <a:ext uri="{FF2B5EF4-FFF2-40B4-BE49-F238E27FC236}">
+                <a16:creationId xmlns:a16="http://schemas.microsoft.com/office/drawing/2014/main" id="{690A6D5F-5B11-4011-866D-2818FD7D0396}"/>
+              </a:ext>
+            </a:extLst>
+          </p:cNvPr>
+          <p:cNvSpPr>
+            <a:spLocks noGrp="1"/>
+          </p:cNvSpPr>
+          <p:nvPr>
+            <p:ph type="body" idx="1"/>
+          </p:nvPr>
+        </p:nvSpPr>
+        <p:spPr>
+          <a:xfrm>
+            <a:off x="1141411" y="3253839"/>
+            <a:ext cx="9906000" cy="2545299"/>
+          </a:xfrm>
+        </p:spPr>
+        <p:txBody>
+          <a:bodyPr/>
+          <a:lstStyle/>
+          <a:p>
+            <a:r>
+              <a:rPr lang="en-US" dirty="0"/>
+              <a:t>evaluate if the number of language supported has any effect on user rating or rating content total. </a:t>
+            </a:r>
+          </a:p>
+          <a:p>
+            <a:r>
+              <a:rPr lang="en-US" dirty="0"/>
+              <a:t>Compare this 2017 Data to 2020. </a:t>
+            </a:r>
+          </a:p>
+          <a:p>
+            <a:r>
+              <a:rPr lang="en-US" dirty="0"/>
+              <a:t>Compare this data to Similar data with Google Apps</a:t>
+            </a:r>
+          </a:p>
+          <a:p>
+            <a:endParaRPr lang="en-US" dirty="0"/>
+          </a:p>
+        </p:txBody>
+      </p:sp>
+    </p:spTree>
+    <p:extLst>
+      <p:ext uri="{BB962C8B-B14F-4D97-AF65-F5344CB8AC3E}">
+        <p14:creationId xmlns:p14="http://schemas.microsoft.com/office/powerpoint/2010/main" val="4185439474"/>
+      </p:ext>
+    </p:extLst>
+  </p:cSld>
+  <p:clrMapOvr>
+    <a:masterClrMapping/>
+  </p:clrMapOvr>
+</p:sld>
+</file>
+
+<file path=ppt/slides/slide11.xml><?xml version="1.0" encoding="utf-8"?>
+<p:sld xmlns:a="http://schemas.openxmlformats.org/drawingml/2006/main" xmlns:r="http://schemas.openxmlformats.org/officeDocument/2006/relationships" xmlns:p="http://schemas.openxmlformats.org/presentationml/2006/main">
+  <p:cSld>
+    <p:spTree>
+      <p:nvGrpSpPr>
+        <p:cNvPr id="1" name=""/>
+        <p:cNvGrpSpPr/>
+        <p:nvPr/>
+      </p:nvGrpSpPr>
+      <p:grpSpPr>
+        <a:xfrm>
+          <a:off x="0" y="0"/>
+          <a:ext cx="0" cy="0"/>
+          <a:chOff x="0" y="0"/>
+          <a:chExt cx="0" cy="0"/>
+        </a:xfrm>
+      </p:grpSpPr>
+      <p:sp>
+        <p:nvSpPr>
+          <p:cNvPr id="2" name="Title 1">
+            <a:extLst>
+              <a:ext uri="{FF2B5EF4-FFF2-40B4-BE49-F238E27FC236}">
+                <a16:creationId xmlns:a16="http://schemas.microsoft.com/office/drawing/2014/main" id="{B02B8D67-62D6-4446-A2F2-C93F1B200A55}"/>
+              </a:ext>
+            </a:extLst>
+          </p:cNvPr>
+          <p:cNvSpPr>
+            <a:spLocks noGrp="1"/>
+          </p:cNvSpPr>
+          <p:nvPr>
+            <p:ph type="title"/>
+          </p:nvPr>
+        </p:nvSpPr>
+        <p:spPr/>
+        <p:txBody>
+          <a:bodyPr/>
+          <a:lstStyle/>
+          <a:p>
+            <a:r>
+              <a:rPr lang="en-US" dirty="0"/>
+              <a:t>Summary</a:t>
+            </a:r>
+          </a:p>
+        </p:txBody>
+      </p:sp>
+      <p:sp>
+        <p:nvSpPr>
+          <p:cNvPr id="3" name="Content Placeholder 2">
+            <a:extLst>
+              <a:ext uri="{FF2B5EF4-FFF2-40B4-BE49-F238E27FC236}">
+                <a16:creationId xmlns:a16="http://schemas.microsoft.com/office/drawing/2014/main" id="{516B5800-5561-49B2-84F6-B9D14862EC8A}"/>
+              </a:ext>
+            </a:extLst>
+          </p:cNvPr>
+          <p:cNvSpPr>
+            <a:spLocks noGrp="1"/>
+          </p:cNvSpPr>
+          <p:nvPr>
+            <p:ph idx="1"/>
+          </p:nvPr>
+        </p:nvSpPr>
+        <p:spPr/>
+        <p:txBody>
+          <a:bodyPr/>
+          <a:lstStyle/>
+          <a:p>
+            <a:r>
+              <a:rPr lang="en-US" dirty="0"/>
+              <a:t>There are a total of 7197 apps on this data set collected in July 2017</a:t>
+            </a:r>
+          </a:p>
+          <a:p>
+            <a:r>
+              <a:rPr lang="en-US" dirty="0"/>
+              <a:t>Education had two of the highest priced apps</a:t>
+            </a:r>
+          </a:p>
+          <a:p>
+            <a:r>
+              <a:rPr lang="en-US" dirty="0"/>
+              <a:t>However medical apps on average cost more</a:t>
+            </a:r>
+          </a:p>
+          <a:p>
+            <a:r>
+              <a:rPr lang="en-US" dirty="0"/>
+              <a:t>There are 3862 Game apps </a:t>
+            </a:r>
+          </a:p>
+          <a:p>
+            <a:endParaRPr lang="en-US" dirty="0"/>
+          </a:p>
+          <a:p>
+            <a:endParaRPr lang="en-US" dirty="0"/>
+          </a:p>
+          <a:p>
+            <a:endParaRPr lang="en-US" dirty="0"/>
+          </a:p>
+          <a:p>
+            <a:endParaRPr lang="en-US" dirty="0"/>
+          </a:p>
+        </p:txBody>
+      </p:sp>
+    </p:spTree>
+    <p:extLst>
+      <p:ext uri="{BB962C8B-B14F-4D97-AF65-F5344CB8AC3E}">
+        <p14:creationId xmlns:p14="http://schemas.microsoft.com/office/powerpoint/2010/main" val="1055199505"/>
+      </p:ext>
+    </p:extLst>
+  </p:cSld>
+  <p:clrMapOvr>
+    <a:masterClrMapping/>
+  </p:clrMapOvr>
+</p:sld>
+</file>
+
+<file path=ppt/slides/slide2.xml><?xml version="1.0" encoding="utf-8"?>
+<p:sld xmlns:a="http://schemas.openxmlformats.org/drawingml/2006/main" xmlns:r="http://schemas.openxmlformats.org/officeDocument/2006/relationships" xmlns:p="http://schemas.openxmlformats.org/presentationml/2006/main">
+  <p:cSld>
+    <p:spTree>
+      <p:nvGrpSpPr>
+        <p:cNvPr id="1" name=""/>
+        <p:cNvGrpSpPr/>
+        <p:nvPr/>
+      </p:nvGrpSpPr>
+      <p:grpSpPr>
+        <a:xfrm>
+          <a:off x="0" y="0"/>
+          <a:ext cx="0" cy="0"/>
+          <a:chOff x="0" y="0"/>
+          <a:chExt cx="0" cy="0"/>
+        </a:xfrm>
+      </p:grpSpPr>
+      <p:sp>
+        <p:nvSpPr>
+          <p:cNvPr id="2" name="Title 1">
+            <a:extLst>
+              <a:ext uri="{FF2B5EF4-FFF2-40B4-BE49-F238E27FC236}">
+                <a16:creationId xmlns:a16="http://schemas.microsoft.com/office/drawing/2014/main" id="{8525D924-80AD-4FFF-85C0-F5C08F39AFDC}"/>
+              </a:ext>
+            </a:extLst>
+          </p:cNvPr>
+          <p:cNvSpPr>
+            <a:spLocks noGrp="1"/>
+          </p:cNvSpPr>
+          <p:nvPr>
+            <p:ph type="title"/>
+          </p:nvPr>
+        </p:nvSpPr>
+        <p:spPr/>
+        <p:txBody>
+          <a:bodyPr/>
+          <a:lstStyle/>
+          <a:p>
+            <a:r>
+              <a:rPr lang="en-US" dirty="0"/>
+              <a:t>Thoughts going in..</a:t>
+            </a:r>
+          </a:p>
+        </p:txBody>
+      </p:sp>
+      <p:sp>
+        <p:nvSpPr>
+          <p:cNvPr id="3" name="Content Placeholder 2">
+            <a:extLst>
+              <a:ext uri="{FF2B5EF4-FFF2-40B4-BE49-F238E27FC236}">
+                <a16:creationId xmlns:a16="http://schemas.microsoft.com/office/drawing/2014/main" id="{C0388CCF-C988-401D-A73A-46921182F5DE}"/>
+              </a:ext>
+            </a:extLst>
+          </p:cNvPr>
+          <p:cNvSpPr>
+            <a:spLocks noGrp="1"/>
+          </p:cNvSpPr>
+          <p:nvPr>
+            <p:ph idx="1"/>
+          </p:nvPr>
+        </p:nvSpPr>
+        <p:spPr/>
+        <p:txBody>
+          <a:bodyPr>
+            <a:normAutofit/>
+          </a:bodyPr>
+          <a:lstStyle/>
+          <a:p>
+            <a:pPr marL="0" indent="0">
+              <a:buNone/>
+            </a:pPr>
+            <a:r>
+              <a:rPr lang="en-US" dirty="0"/>
+              <a:t>Plenty of info in the dataset </a:t>
+            </a:r>
+          </a:p>
+          <a:p>
+            <a:pPr marL="0" indent="0">
+              <a:buNone/>
+            </a:pPr>
+            <a:r>
+              <a:rPr lang="en-US" dirty="0"/>
+              <a:t>No preconceived thoughts or expectations regarding Mobile Apps</a:t>
+            </a:r>
+          </a:p>
+          <a:p>
+            <a:pPr marL="0" indent="0">
+              <a:buNone/>
+            </a:pPr>
+            <a:endParaRPr lang="en-US" dirty="0"/>
+          </a:p>
+        </p:txBody>
+      </p:sp>
+      <p:pic>
+        <p:nvPicPr>
+          <p:cNvPr id="4" name="Content Placeholder 15">
+            <a:extLst>
+              <a:ext uri="{FF2B5EF4-FFF2-40B4-BE49-F238E27FC236}">
+                <a16:creationId xmlns:a16="http://schemas.microsoft.com/office/drawing/2014/main" id="{324C0982-B589-4D01-B8C0-64FE3F5FF0E0}"/>
+              </a:ext>
+            </a:extLst>
+          </p:cNvPr>
+          <p:cNvPicPr>
+            <a:picLocks noChangeAspect="1"/>
+          </p:cNvPicPr>
+          <p:nvPr/>
+        </p:nvPicPr>
+        <p:blipFill>
+          <a:blip r:embed="rId3">
+            <a:extLst>
+              <a:ext uri="{28A0092B-C50C-407E-A947-70E740481C1C}">
+                <a14:useLocalDpi xmlns:a14="http://schemas.microsoft.com/office/drawing/2010/main" val="0"/>
+              </a:ext>
+            </a:extLst>
+          </a:blip>
+          <a:stretch>
+            <a:fillRect/>
+          </a:stretch>
+        </p:blipFill>
+        <p:spPr>
+          <a:xfrm>
+            <a:off x="766342" y="4020344"/>
+            <a:ext cx="10919298" cy="1527244"/>
+          </a:xfrm>
+          <a:prstGeom prst="rect">
+            <a:avLst/>
+          </a:prstGeom>
+        </p:spPr>
+      </p:pic>
+    </p:spTree>
+    <p:extLst>
+      <p:ext uri="{BB962C8B-B14F-4D97-AF65-F5344CB8AC3E}">
+        <p14:creationId xmlns:p14="http://schemas.microsoft.com/office/powerpoint/2010/main" val="215026579"/>
+      </p:ext>
+    </p:extLst>
+  </p:cSld>
+  <p:clrMapOvr>
+    <a:masterClrMapping/>
+  </p:clrMapOvr>
+</p:sld>
+</file>
+
+<file path=ppt/slides/slide3.xml><?xml version="1.0" encoding="utf-8"?>
+<p:sld xmlns:a="http://schemas.openxmlformats.org/drawingml/2006/main" xmlns:r="http://schemas.openxmlformats.org/officeDocument/2006/relationships" xmlns:p="http://schemas.openxmlformats.org/presentationml/2006/main">
+  <p:cSld>
+    <p:spTree>
+      <p:nvGrpSpPr>
+        <p:cNvPr id="1" name=""/>
+        <p:cNvGrpSpPr/>
+        <p:nvPr/>
+      </p:nvGrpSpPr>
+      <p:grpSpPr>
+        <a:xfrm>
+          <a:off x="0" y="0"/>
+          <a:ext cx="0" cy="0"/>
+          <a:chOff x="0" y="0"/>
+          <a:chExt cx="0" cy="0"/>
+        </a:xfrm>
+      </p:grpSpPr>
+      <p:sp>
+        <p:nvSpPr>
+          <p:cNvPr id="2" name="Title 1">
+            <a:extLst>
+              <a:ext uri="{FF2B5EF4-FFF2-40B4-BE49-F238E27FC236}">
+                <a16:creationId xmlns:a16="http://schemas.microsoft.com/office/drawing/2014/main" id="{91ED8CB7-73BA-47F9-851A-B2F138D7B836}"/>
+              </a:ext>
+            </a:extLst>
+          </p:cNvPr>
+          <p:cNvSpPr>
+            <a:spLocks noGrp="1"/>
+          </p:cNvSpPr>
+          <p:nvPr>
+            <p:ph type="title"/>
+          </p:nvPr>
+        </p:nvSpPr>
+        <p:spPr/>
+        <p:txBody>
+          <a:bodyPr/>
+          <a:lstStyle/>
+          <a:p>
+            <a:r>
+              <a:rPr lang="en-US" dirty="0"/>
+              <a:t>Cleaning</a:t>
+            </a:r>
+          </a:p>
+        </p:txBody>
+      </p:sp>
+      <p:pic>
+        <p:nvPicPr>
+          <p:cNvPr id="10" name="Content Placeholder 9">
+            <a:extLst>
+              <a:ext uri="{FF2B5EF4-FFF2-40B4-BE49-F238E27FC236}">
+                <a16:creationId xmlns:a16="http://schemas.microsoft.com/office/drawing/2014/main" id="{35AC9180-7BF0-4FA8-BE40-86F251369683}"/>
+              </a:ext>
+            </a:extLst>
+          </p:cNvPr>
+          <p:cNvPicPr>
+            <a:picLocks noGrp="1" noChangeAspect="1"/>
+          </p:cNvPicPr>
+          <p:nvPr>
+            <p:ph idx="1"/>
+          </p:nvPr>
+        </p:nvPicPr>
+        <p:blipFill>
+          <a:blip r:embed="rId3">
+            <a:extLst>
+              <a:ext uri="{28A0092B-C50C-407E-A947-70E740481C1C}">
+                <a14:useLocalDpi xmlns:a14="http://schemas.microsoft.com/office/drawing/2010/main" val="0"/>
+              </a:ext>
+            </a:extLst>
+          </a:blip>
+          <a:stretch>
+            <a:fillRect/>
+          </a:stretch>
+        </p:blipFill>
+        <p:spPr>
+          <a:xfrm>
+            <a:off x="5924256" y="592138"/>
+            <a:ext cx="4355100" cy="5199062"/>
+          </a:xfrm>
+        </p:spPr>
+      </p:pic>
+      <p:sp>
+        <p:nvSpPr>
+          <p:cNvPr id="4" name="Text Placeholder 3">
+            <a:extLst>
+              <a:ext uri="{FF2B5EF4-FFF2-40B4-BE49-F238E27FC236}">
+                <a16:creationId xmlns:a16="http://schemas.microsoft.com/office/drawing/2014/main" id="{A698D26E-004C-49D3-A37E-CAE3D89363AA}"/>
+              </a:ext>
+            </a:extLst>
+          </p:cNvPr>
+          <p:cNvSpPr>
+            <a:spLocks noGrp="1"/>
+          </p:cNvSpPr>
+          <p:nvPr>
+            <p:ph type="body" sz="half" idx="2"/>
+          </p:nvPr>
+        </p:nvSpPr>
+        <p:spPr>
+          <a:xfrm>
+            <a:off x="1146705" y="2249486"/>
+            <a:ext cx="3856037" cy="1467491"/>
+          </a:xfrm>
+        </p:spPr>
+        <p:txBody>
+          <a:bodyPr/>
+          <a:lstStyle/>
+          <a:p>
+            <a:pPr marL="285750" indent="-285750">
+              <a:buFontTx/>
+              <a:buChar char="-"/>
+            </a:pPr>
+            <a:r>
+              <a:rPr lang="en-US" dirty="0"/>
+              <a:t>No null or Nan characters found</a:t>
+            </a:r>
+          </a:p>
+          <a:p>
+            <a:pPr marL="285750" indent="-285750">
+              <a:buFontTx/>
+              <a:buChar char="-"/>
+            </a:pPr>
+            <a:r>
+              <a:rPr lang="en-US" dirty="0"/>
+              <a:t>Non English text has been the only real aversion</a:t>
+            </a:r>
+          </a:p>
+          <a:p>
+            <a:endParaRPr lang="en-US" dirty="0"/>
+          </a:p>
+        </p:txBody>
+      </p:sp>
+      <p:sp>
+        <p:nvSpPr>
+          <p:cNvPr id="11" name="TextBox 10">
+            <a:extLst>
+              <a:ext uri="{FF2B5EF4-FFF2-40B4-BE49-F238E27FC236}">
+                <a16:creationId xmlns:a16="http://schemas.microsoft.com/office/drawing/2014/main" id="{AAD837BD-0710-4596-BB2D-ADFEBE2B2115}"/>
+              </a:ext>
+            </a:extLst>
+          </p:cNvPr>
+          <p:cNvSpPr txBox="1"/>
+          <p:nvPr/>
+        </p:nvSpPr>
+        <p:spPr>
+          <a:xfrm>
+            <a:off x="1146705" y="4239183"/>
+            <a:ext cx="4355100" cy="707886"/>
+          </a:xfrm>
+          <a:prstGeom prst="rect">
+            <a:avLst/>
+          </a:prstGeom>
+          <a:noFill/>
+          <a:effectLst>
+            <a:glow rad="101600">
+              <a:schemeClr val="accent5">
+                <a:satMod val="175000"/>
+                <a:alpha val="40000"/>
+              </a:schemeClr>
+            </a:glow>
+          </a:effectLst>
+          <a:scene3d>
+            <a:camera prst="perspectiveLeft"/>
+            <a:lightRig rig="threePt" dir="t"/>
+          </a:scene3d>
+        </p:spPr>
+        <p:txBody>
+          <a:bodyPr wrap="square">
+            <a:spAutoFit/>
+            <a:scene3d>
+              <a:camera prst="orthographicFront"/>
+              <a:lightRig rig="harsh" dir="t"/>
+            </a:scene3d>
+            <a:sp3d extrusionH="57150" prstMaterial="matte">
+              <a:bevelT w="63500" h="12700" prst="angle"/>
+              <a:contourClr>
+                <a:schemeClr val="bg1">
+                  <a:lumMod val="65000"/>
+                </a:schemeClr>
+              </a:contourClr>
+            </a:sp3d>
+          </a:bodyPr>
+          <a:lstStyle/>
+          <a:p>
+            <a:pPr algn="ctr"/>
+            <a:r>
+              <a:rPr lang="en-US" sz="2000" b="1" dirty="0">
+                <a:ln/>
+                <a:solidFill>
+                  <a:schemeClr val="accent3"/>
+                </a:solidFill>
+              </a:rPr>
+              <a:t>For each Genre, what is the highest priced app? </a:t>
+            </a:r>
+            <a:r>
+              <a:rPr lang="en-US" sz="2000" b="1" dirty="0">
+                <a:ln/>
+                <a:solidFill>
+                  <a:schemeClr val="accent3"/>
+                </a:solidFill>
+                <a:sym typeface="Wingdings" panose="05000000000000000000" pitchFamily="2" charset="2"/>
+              </a:rPr>
+              <a:t></a:t>
+            </a:r>
+            <a:endParaRPr lang="en-US" sz="2000" b="1" dirty="0">
+              <a:ln/>
+              <a:solidFill>
+                <a:schemeClr val="accent3"/>
+              </a:solidFill>
+            </a:endParaRPr>
+          </a:p>
+        </p:txBody>
+      </p:sp>
+    </p:spTree>
+    <p:extLst>
+      <p:ext uri="{BB962C8B-B14F-4D97-AF65-F5344CB8AC3E}">
+        <p14:creationId xmlns:p14="http://schemas.microsoft.com/office/powerpoint/2010/main" val="3690492194"/>
+      </p:ext>
+    </p:extLst>
+  </p:cSld>
+  <p:clrMapOvr>
+    <a:masterClrMapping/>
+  </p:clrMapOvr>
+</p:sld>
+</file>
+
+<file path=ppt/slides/slide4.xml><?xml version="1.0" encoding="utf-8"?>
+<p:sld xmlns:a="http://schemas.openxmlformats.org/drawingml/2006/main" xmlns:r="http://schemas.openxmlformats.org/officeDocument/2006/relationships" xmlns:p="http://schemas.openxmlformats.org/presentationml/2006/main">
+  <p:cSld>
+    <p:spTree>
+      <p:nvGrpSpPr>
+        <p:cNvPr id="1" name=""/>
+        <p:cNvGrpSpPr/>
+        <p:nvPr/>
+      </p:nvGrpSpPr>
+      <p:grpSpPr>
+        <a:xfrm>
+          <a:off x="0" y="0"/>
+          <a:ext cx="0" cy="0"/>
+          <a:chOff x="0" y="0"/>
+          <a:chExt cx="0" cy="0"/>
+        </a:xfrm>
+      </p:grpSpPr>
+      <p:sp>
+        <p:nvSpPr>
+          <p:cNvPr id="2" name="Title 1">
+            <a:extLst>
+              <a:ext uri="{FF2B5EF4-FFF2-40B4-BE49-F238E27FC236}">
+                <a16:creationId xmlns:a16="http://schemas.microsoft.com/office/drawing/2014/main" id="{80D89318-BB38-43FA-8990-6D2785E8984E}"/>
+              </a:ext>
+            </a:extLst>
+          </p:cNvPr>
+          <p:cNvSpPr>
+            <a:spLocks noGrp="1"/>
+          </p:cNvSpPr>
+          <p:nvPr>
+            <p:ph type="title"/>
+          </p:nvPr>
+        </p:nvSpPr>
+        <p:spPr/>
+        <p:txBody>
+          <a:bodyPr/>
+          <a:lstStyle/>
+          <a:p>
+            <a:r>
+              <a:rPr lang="en-US" dirty="0"/>
+              <a:t>Before and after</a:t>
+            </a:r>
+          </a:p>
+        </p:txBody>
+      </p:sp>
+      <p:sp>
+        <p:nvSpPr>
+          <p:cNvPr id="3" name="Text Placeholder 2">
+            <a:extLst>
+              <a:ext uri="{FF2B5EF4-FFF2-40B4-BE49-F238E27FC236}">
+                <a16:creationId xmlns:a16="http://schemas.microsoft.com/office/drawing/2014/main" id="{597B88FC-A816-48CD-99CB-F14186F04A02}"/>
+              </a:ext>
+            </a:extLst>
+          </p:cNvPr>
+          <p:cNvSpPr>
+            <a:spLocks noGrp="1"/>
+          </p:cNvSpPr>
+          <p:nvPr>
+            <p:ph type="body" idx="1"/>
+          </p:nvPr>
+        </p:nvSpPr>
+        <p:spPr/>
+        <p:txBody>
+          <a:bodyPr/>
+          <a:lstStyle/>
+          <a:p>
+            <a:endParaRPr lang="en-US"/>
+          </a:p>
+        </p:txBody>
+      </p:sp>
+      <p:pic>
+        <p:nvPicPr>
+          <p:cNvPr id="8" name="Content Placeholder 7">
+            <a:extLst>
+              <a:ext uri="{FF2B5EF4-FFF2-40B4-BE49-F238E27FC236}">
+                <a16:creationId xmlns:a16="http://schemas.microsoft.com/office/drawing/2014/main" id="{EC37CDDB-8389-47DA-84B9-D749C263653D}"/>
+              </a:ext>
+            </a:extLst>
+          </p:cNvPr>
+          <p:cNvPicPr>
+            <a:picLocks noGrp="1" noChangeAspect="1"/>
+          </p:cNvPicPr>
+          <p:nvPr>
+            <p:ph sz="half" idx="2"/>
+          </p:nvPr>
+        </p:nvPicPr>
+        <p:blipFill>
+          <a:blip r:embed="rId2">
+            <a:extLst>
+              <a:ext uri="{28A0092B-C50C-407E-A947-70E740481C1C}">
+                <a14:useLocalDpi xmlns:a14="http://schemas.microsoft.com/office/drawing/2010/main" val="0"/>
+              </a:ext>
+            </a:extLst>
+          </a:blip>
+          <a:stretch>
+            <a:fillRect/>
+          </a:stretch>
+        </p:blipFill>
+        <p:spPr>
+          <a:xfrm>
+            <a:off x="1141412" y="2029512"/>
+            <a:ext cx="3834350" cy="4577398"/>
+          </a:xfrm>
+        </p:spPr>
+      </p:pic>
+      <p:sp>
+        <p:nvSpPr>
+          <p:cNvPr id="5" name="Text Placeholder 4">
+            <a:extLst>
+              <a:ext uri="{FF2B5EF4-FFF2-40B4-BE49-F238E27FC236}">
+                <a16:creationId xmlns:a16="http://schemas.microsoft.com/office/drawing/2014/main" id="{51873F4D-BF77-4ADD-B792-ECF7DB2DDC2C}"/>
+              </a:ext>
+            </a:extLst>
+          </p:cNvPr>
+          <p:cNvSpPr>
+            <a:spLocks noGrp="1"/>
+          </p:cNvSpPr>
+          <p:nvPr>
+            <p:ph type="body" sz="quarter" idx="3"/>
+          </p:nvPr>
+        </p:nvSpPr>
+        <p:spPr/>
+        <p:txBody>
+          <a:bodyPr/>
+          <a:lstStyle/>
+          <a:p>
+            <a:endParaRPr lang="en-US"/>
+          </a:p>
+        </p:txBody>
+      </p:sp>
+      <p:pic>
+        <p:nvPicPr>
+          <p:cNvPr id="14" name="Content Placeholder 13">
+            <a:extLst>
+              <a:ext uri="{FF2B5EF4-FFF2-40B4-BE49-F238E27FC236}">
+                <a16:creationId xmlns:a16="http://schemas.microsoft.com/office/drawing/2014/main" id="{50FC353C-7367-450B-A3A0-FD29E366C365}"/>
+              </a:ext>
+            </a:extLst>
+          </p:cNvPr>
+          <p:cNvPicPr>
+            <a:picLocks noGrp="1" noChangeAspect="1"/>
+          </p:cNvPicPr>
+          <p:nvPr>
+            <p:ph sz="quarter" idx="4"/>
+          </p:nvPr>
+        </p:nvPicPr>
+        <p:blipFill>
+          <a:blip r:embed="rId3"/>
+          <a:stretch>
+            <a:fillRect/>
+          </a:stretch>
+        </p:blipFill>
+        <p:spPr>
+          <a:xfrm>
+            <a:off x="6887687" y="1988711"/>
+            <a:ext cx="3657601" cy="4667567"/>
+          </a:xfrm>
+        </p:spPr>
+      </p:pic>
+    </p:spTree>
+    <p:extLst>
+      <p:ext uri="{BB962C8B-B14F-4D97-AF65-F5344CB8AC3E}">
+        <p14:creationId xmlns:p14="http://schemas.microsoft.com/office/powerpoint/2010/main" val="1984394337"/>
+      </p:ext>
+    </p:extLst>
+  </p:cSld>
+  <p:clrMapOvr>
+    <a:masterClrMapping/>
+  </p:clrMapOvr>
+</p:sld>
+</file>
+
+<file path=ppt/slides/slide5.xml><?xml version="1.0" encoding="utf-8"?>
+<p:sld xmlns:a="http://schemas.openxmlformats.org/drawingml/2006/main" xmlns:r="http://schemas.openxmlformats.org/officeDocument/2006/relationships" xmlns:p="http://schemas.openxmlformats.org/presentationml/2006/main">
+  <p:cSld>
+    <p:spTree>
+      <p:nvGrpSpPr>
+        <p:cNvPr id="1" name=""/>
+        <p:cNvGrpSpPr/>
+        <p:nvPr/>
+      </p:nvGrpSpPr>
+      <p:grpSpPr>
+        <a:xfrm>
+          <a:off x="0" y="0"/>
+          <a:ext cx="0" cy="0"/>
+          <a:chOff x="0" y="0"/>
+          <a:chExt cx="0" cy="0"/>
+        </a:xfrm>
+      </p:grpSpPr>
+      <p:sp>
+        <p:nvSpPr>
+          <p:cNvPr id="2" name="Title 1">
+            <a:extLst>
+              <a:ext uri="{FF2B5EF4-FFF2-40B4-BE49-F238E27FC236}">
+                <a16:creationId xmlns:a16="http://schemas.microsoft.com/office/drawing/2014/main" id="{EBE29AA4-268B-47A9-8631-09BF8343B9D0}"/>
+              </a:ext>
+            </a:extLst>
+          </p:cNvPr>
+          <p:cNvSpPr>
+            <a:spLocks noGrp="1"/>
+          </p:cNvSpPr>
+          <p:nvPr>
+            <p:ph type="title"/>
+          </p:nvPr>
+        </p:nvSpPr>
+        <p:spPr/>
+        <p:txBody>
+          <a:bodyPr/>
+          <a:lstStyle/>
+          <a:p>
+            <a:r>
+              <a:rPr lang="en-US" dirty="0"/>
+              <a:t>Findings</a:t>
+            </a:r>
+          </a:p>
+        </p:txBody>
+      </p:sp>
+      <p:pic>
+        <p:nvPicPr>
+          <p:cNvPr id="4" name="Picture 3">
+            <a:extLst>
+              <a:ext uri="{FF2B5EF4-FFF2-40B4-BE49-F238E27FC236}">
+                <a16:creationId xmlns:a16="http://schemas.microsoft.com/office/drawing/2014/main" id="{08C62301-AAB5-453A-8348-4824F6E53636}"/>
+              </a:ext>
+            </a:extLst>
+          </p:cNvPr>
+          <p:cNvPicPr>
+            <a:picLocks noChangeAspect="1"/>
+          </p:cNvPicPr>
+          <p:nvPr/>
+        </p:nvPicPr>
+        <p:blipFill>
+          <a:blip r:embed="rId3"/>
+          <a:stretch>
+            <a:fillRect/>
+          </a:stretch>
+        </p:blipFill>
+        <p:spPr>
+          <a:xfrm>
+            <a:off x="1745804" y="4530967"/>
+            <a:ext cx="8455099" cy="1079774"/>
+          </a:xfrm>
+          <a:prstGeom prst="rect">
+            <a:avLst/>
+          </a:prstGeom>
+        </p:spPr>
+      </p:pic>
+      <p:pic>
+        <p:nvPicPr>
+          <p:cNvPr id="1026" name="Picture 2">
+            <a:extLst>
+              <a:ext uri="{FF2B5EF4-FFF2-40B4-BE49-F238E27FC236}">
+                <a16:creationId xmlns:a16="http://schemas.microsoft.com/office/drawing/2014/main" id="{852F609E-1643-4D9C-9B83-E0B8D588A888}"/>
+              </a:ext>
+            </a:extLst>
+          </p:cNvPr>
+          <p:cNvPicPr>
+            <a:picLocks noChangeAspect="1" noChangeArrowheads="1"/>
+          </p:cNvPicPr>
+          <p:nvPr/>
+        </p:nvPicPr>
+        <p:blipFill>
+          <a:blip r:embed="rId4">
+            <a:extLst>
+              <a:ext uri="{28A0092B-C50C-407E-A947-70E740481C1C}">
+                <a14:useLocalDpi xmlns:a14="http://schemas.microsoft.com/office/drawing/2010/main" val="0"/>
+              </a:ext>
+            </a:extLst>
+          </a:blip>
+          <a:srcRect/>
+          <a:stretch>
+            <a:fillRect/>
+          </a:stretch>
+        </p:blipFill>
+        <p:spPr bwMode="auto">
+          <a:xfrm>
+            <a:off x="784163" y="2097088"/>
+            <a:ext cx="10623673" cy="1964273"/>
+          </a:xfrm>
+          <a:prstGeom prst="rect">
+            <a:avLst/>
+          </a:prstGeom>
+          <a:solidFill>
+            <a:schemeClr val="bg2">
+              <a:lumMod val="10000"/>
+              <a:lumOff val="90000"/>
+            </a:schemeClr>
+          </a:solidFill>
+        </p:spPr>
+      </p:pic>
+    </p:spTree>
+    <p:extLst>
+      <p:ext uri="{BB962C8B-B14F-4D97-AF65-F5344CB8AC3E}">
+        <p14:creationId xmlns:p14="http://schemas.microsoft.com/office/powerpoint/2010/main" val="120177263"/>
+      </p:ext>
+    </p:extLst>
+  </p:cSld>
+  <p:clrMapOvr>
+    <a:masterClrMapping/>
+  </p:clrMapOvr>
+  <p:timing>
+    <p:tnLst>
+      <p:par>
+        <p:cTn id="1" dur="indefinite" restart="never" nodeType="tmRoot">
+          <p:childTnLst>
+            <p:seq concurrent="1" nextAc="seek">
+              <p:cTn id="2" dur="indefinite" nodeType="mainSeq">
+                <p:childTnLst>
+                  <p:par>
+                    <p:cTn id="3" fill="hold">
+                      <p:stCondLst>
+                        <p:cond delay="indefinite"/>
+                      </p:stCondLst>
+                      <p:childTnLst>
+                        <p:par>
+                          <p:cTn id="4" fill="hold">
+                            <p:stCondLst>
+                              <p:cond delay="0"/>
+                            </p:stCondLst>
+                            <p:childTnLst>
+                              <p:par>
+                                <p:cTn id="5" presetID="1" presetClass="entr" presetSubtype="0" fill="hold" nodeType="clickEffect">
+                                  <p:stCondLst>
+                                    <p:cond delay="500"/>
+                                  </p:stCondLst>
+                                  <p:childTnLst>
+                                    <p:set>
+                                      <p:cBhvr>
+                                        <p:cTn id="6" dur="1" fill="hold">
+                                          <p:stCondLst>
+                                            <p:cond delay="0"/>
+                                          </p:stCondLst>
+                                        </p:cTn>
+                                        <p:tgtEl>
+                                          <p:spTgt spid="4"/>
+                                        </p:tgtEl>
+                                        <p:attrNameLst>
+                                          <p:attrName>style.visibility</p:attrName>
+                                        </p:attrNameLst>
+                                      </p:cBhvr>
+                                      <p:to>
+                                        <p:strVal val="visible"/>
+                                      </p:to>
+                                    </p:set>
+                                  </p:childTnLst>
+                                </p:cTn>
+                              </p:par>
+                            </p:childTnLst>
+                          </p:cTn>
+                        </p:par>
+                      </p:childTnLst>
+                    </p:cTn>
+                  </p:par>
+                </p:childTnLst>
+              </p:cTn>
+              <p:prevCondLst>
+                <p:cond evt="onPrev" delay="0">
+                  <p:tgtEl>
+                    <p:sldTgt/>
+                  </p:tgtEl>
+                </p:cond>
+              </p:prevCondLst>
+              <p:nextCondLst>
+                <p:cond evt="onNext" delay="0">
+                  <p:tgtEl>
+                    <p:sldTgt/>
+                  </p:tgtEl>
+                </p:cond>
+              </p:nextCondLst>
+            </p:seq>
+          </p:childTnLst>
+        </p:cTn>
+      </p:par>
+    </p:tnLst>
+  </p:timing>
+</p:sld>
+</file>
+
+<file path=ppt/slides/slide6.xml><?xml version="1.0" encoding="utf-8"?>
+<p:sld xmlns:a="http://schemas.openxmlformats.org/drawingml/2006/main" xmlns:r="http://schemas.openxmlformats.org/officeDocument/2006/relationships" xmlns:p="http://schemas.openxmlformats.org/presentationml/2006/main">
+  <p:cSld>
+    <p:spTree>
+      <p:nvGrpSpPr>
+        <p:cNvPr id="1" name=""/>
+        <p:cNvGrpSpPr/>
+        <p:nvPr/>
+      </p:nvGrpSpPr>
+      <p:grpSpPr>
+        <a:xfrm>
+          <a:off x="0" y="0"/>
+          <a:ext cx="0" cy="0"/>
+          <a:chOff x="0" y="0"/>
+          <a:chExt cx="0" cy="0"/>
+        </a:xfrm>
+      </p:grpSpPr>
+      <p:sp>
+        <p:nvSpPr>
+          <p:cNvPr id="2" name="Title 1">
+            <a:extLst>
+              <a:ext uri="{FF2B5EF4-FFF2-40B4-BE49-F238E27FC236}">
+                <a16:creationId xmlns:a16="http://schemas.microsoft.com/office/drawing/2014/main" id="{A7353835-F4C9-43E0-90C6-AE91A74DF4A0}"/>
+              </a:ext>
+            </a:extLst>
+          </p:cNvPr>
+          <p:cNvSpPr>
+            <a:spLocks noGrp="1"/>
+          </p:cNvSpPr>
+          <p:nvPr>
+            <p:ph type="title"/>
+          </p:nvPr>
+        </p:nvSpPr>
+        <p:spPr/>
+        <p:txBody>
+          <a:bodyPr>
+            <a:normAutofit/>
+          </a:bodyPr>
+          <a:lstStyle/>
+          <a:p>
+            <a:r>
+              <a:rPr lang="en-US" sz="2800" dirty="0"/>
+              <a:t>Findings Continued</a:t>
+            </a:r>
+          </a:p>
+        </p:txBody>
+      </p:sp>
+      <p:pic>
+        <p:nvPicPr>
+          <p:cNvPr id="2050" name="Picture 2">
+            <a:extLst>
+              <a:ext uri="{FF2B5EF4-FFF2-40B4-BE49-F238E27FC236}">
+                <a16:creationId xmlns:a16="http://schemas.microsoft.com/office/drawing/2014/main" id="{CEB896AE-6CE2-4323-A21B-887A7078A26E}"/>
+              </a:ext>
+            </a:extLst>
+          </p:cNvPr>
+          <p:cNvPicPr>
+            <a:picLocks noChangeAspect="1" noChangeArrowheads="1"/>
+          </p:cNvPicPr>
+          <p:nvPr/>
+        </p:nvPicPr>
+        <p:blipFill>
+          <a:blip r:embed="rId3">
+            <a:extLst>
+              <a:ext uri="{28A0092B-C50C-407E-A947-70E740481C1C}">
+                <a14:useLocalDpi xmlns:a14="http://schemas.microsoft.com/office/drawing/2010/main" val="0"/>
+              </a:ext>
+            </a:extLst>
+          </a:blip>
+          <a:srcRect/>
+          <a:stretch>
+            <a:fillRect/>
+          </a:stretch>
+        </p:blipFill>
+        <p:spPr bwMode="auto">
+          <a:xfrm>
+            <a:off x="2481943" y="1903142"/>
+            <a:ext cx="6709559" cy="4054907"/>
+          </a:xfrm>
+          <a:prstGeom prst="rect">
+            <a:avLst/>
+          </a:prstGeom>
+          <a:solidFill>
+            <a:schemeClr val="tx1">
+              <a:lumMod val="95000"/>
+            </a:schemeClr>
+          </a:solidFill>
+        </p:spPr>
+      </p:pic>
+    </p:spTree>
+    <p:extLst>
+      <p:ext uri="{BB962C8B-B14F-4D97-AF65-F5344CB8AC3E}">
+        <p14:creationId xmlns:p14="http://schemas.microsoft.com/office/powerpoint/2010/main" val="115235099"/>
+      </p:ext>
+    </p:extLst>
+  </p:cSld>
+  <p:clrMapOvr>
+    <a:masterClrMapping/>
+  </p:clrMapOvr>
+</p:sld>
+</file>
+
+<file path=ppt/slides/slide7.xml><?xml version="1.0" encoding="utf-8"?>
 <p:sld xmlns:a="http://schemas.openxmlformats.org/drawingml/2006/main" xmlns:r="http://schemas.openxmlformats.org/officeDocument/2006/relationships" xmlns:p="http://schemas.openxmlformats.org/presentationml/2006/main">
   <p:cSld>
     <p:spTree>
@@ -13786,204 +15212,128 @@
   <p:clrMapOvr>
     <a:masterClrMapping/>
   </p:clrMapOvr>
+  <p:timing>
+    <p:tnLst>
+      <p:par>
+        <p:cTn id="1" dur="indefinite" restart="never" nodeType="tmRoot">
+          <p:childTnLst>
+            <p:seq concurrent="1" nextAc="seek">
+              <p:cTn id="2" dur="indefinite" nodeType="mainSeq">
+                <p:childTnLst>
+                  <p:par>
+                    <p:cTn id="3" fill="hold">
+                      <p:stCondLst>
+                        <p:cond delay="indefinite"/>
+                      </p:stCondLst>
+                      <p:childTnLst>
+                        <p:par>
+                          <p:cTn id="4" fill="hold">
+                            <p:stCondLst>
+                              <p:cond delay="0"/>
+                            </p:stCondLst>
+                            <p:childTnLst>
+                              <p:par>
+                                <p:cTn id="5" presetID="10" presetClass="entr" presetSubtype="0" fill="hold" nodeType="clickEffect">
+                                  <p:stCondLst>
+                                    <p:cond delay="0"/>
+                                  </p:stCondLst>
+                                  <p:childTnLst>
+                                    <p:set>
+                                      <p:cBhvr>
+                                        <p:cTn id="6" dur="1" fill="hold">
+                                          <p:stCondLst>
+                                            <p:cond delay="0"/>
+                                          </p:stCondLst>
+                                        </p:cTn>
+                                        <p:tgtEl>
+                                          <p:spTgt spid="5"/>
+                                        </p:tgtEl>
+                                        <p:attrNameLst>
+                                          <p:attrName>style.visibility</p:attrName>
+                                        </p:attrNameLst>
+                                      </p:cBhvr>
+                                      <p:to>
+                                        <p:strVal val="visible"/>
+                                      </p:to>
+                                    </p:set>
+                                    <p:animEffect transition="in" filter="fade">
+                                      <p:cBhvr>
+                                        <p:cTn id="7" dur="500"/>
+                                        <p:tgtEl>
+                                          <p:spTgt spid="5"/>
+                                        </p:tgtEl>
+                                      </p:cBhvr>
+                                    </p:animEffect>
+                                  </p:childTnLst>
+                                </p:cTn>
+                              </p:par>
+                              <p:par>
+                                <p:cTn id="8" presetID="10" presetClass="entr" presetSubtype="0" fill="hold" nodeType="withEffect">
+                                  <p:stCondLst>
+                                    <p:cond delay="0"/>
+                                  </p:stCondLst>
+                                  <p:childTnLst>
+                                    <p:set>
+                                      <p:cBhvr>
+                                        <p:cTn id="9" dur="1" fill="hold">
+                                          <p:stCondLst>
+                                            <p:cond delay="0"/>
+                                          </p:stCondLst>
+                                        </p:cTn>
+                                        <p:tgtEl>
+                                          <p:spTgt spid="7"/>
+                                        </p:tgtEl>
+                                        <p:attrNameLst>
+                                          <p:attrName>style.visibility</p:attrName>
+                                        </p:attrNameLst>
+                                      </p:cBhvr>
+                                      <p:to>
+                                        <p:strVal val="visible"/>
+                                      </p:to>
+                                    </p:set>
+                                    <p:animEffect transition="in" filter="fade">
+                                      <p:cBhvr>
+                                        <p:cTn id="10" dur="500"/>
+                                        <p:tgtEl>
+                                          <p:spTgt spid="7"/>
+                                        </p:tgtEl>
+                                      </p:cBhvr>
+                                    </p:animEffect>
+                                  </p:childTnLst>
+                                </p:cTn>
+                              </p:par>
+                            </p:childTnLst>
+                          </p:cTn>
+                        </p:par>
+                      </p:childTnLst>
+                    </p:cTn>
+                  </p:par>
+                </p:childTnLst>
+              </p:cTn>
+              <p:prevCondLst>
+                <p:cond evt="onPrev" delay="0">
+                  <p:tgtEl>
+                    <p:sldTgt/>
+                  </p:tgtEl>
+                </p:cond>
+              </p:prevCondLst>
+              <p:nextCondLst>
+                <p:cond evt="onNext" delay="0">
+                  <p:tgtEl>
+                    <p:sldTgt/>
+                  </p:tgtEl>
+                </p:cond>
+              </p:nextCondLst>
+            </p:seq>
+          </p:childTnLst>
+        </p:cTn>
+      </p:par>
+    </p:tnLst>
+  </p:timing>
 </p:sld>
 </file>
 
-<file path=ppt/slides/slide11.xml><?xml version="1.0" encoding="utf-8"?>
-<p:sld xmlns:a="http://schemas.openxmlformats.org/drawingml/2006/main" xmlns:r="http://schemas.openxmlformats.org/officeDocument/2006/relationships" xmlns:p="http://schemas.openxmlformats.org/presentationml/2006/main">
-  <p:cSld>
-    <p:spTree>
-      <p:nvGrpSpPr>
-        <p:cNvPr id="1" name=""/>
-        <p:cNvGrpSpPr/>
-        <p:nvPr/>
-      </p:nvGrpSpPr>
-      <p:grpSpPr>
-        <a:xfrm>
-          <a:off x="0" y="0"/>
-          <a:ext cx="0" cy="0"/>
-          <a:chOff x="0" y="0"/>
-          <a:chExt cx="0" cy="0"/>
-        </a:xfrm>
-      </p:grpSpPr>
-      <p:sp>
-        <p:nvSpPr>
-          <p:cNvPr id="2" name="Title 1">
-            <a:extLst>
-              <a:ext uri="{FF2B5EF4-FFF2-40B4-BE49-F238E27FC236}">
-                <a16:creationId xmlns:a16="http://schemas.microsoft.com/office/drawing/2014/main" id="{E48CC9B2-2863-4065-BE7F-5D0A1E9A3C1F}"/>
-              </a:ext>
-            </a:extLst>
-          </p:cNvPr>
-          <p:cNvSpPr>
-            <a:spLocks noGrp="1"/>
-          </p:cNvSpPr>
-          <p:nvPr>
-            <p:ph type="title"/>
-          </p:nvPr>
-        </p:nvSpPr>
-        <p:spPr/>
-        <p:txBody>
-          <a:bodyPr/>
-          <a:lstStyle/>
-          <a:p>
-            <a:r>
-              <a:rPr lang="en-US" dirty="0"/>
-              <a:t>Utilizing </a:t>
-            </a:r>
-            <a:r>
-              <a:rPr lang="en-US" dirty="0" err="1"/>
-              <a:t>dataWrapper</a:t>
-            </a:r>
-            <a:endParaRPr lang="en-US" dirty="0"/>
-          </a:p>
-        </p:txBody>
-      </p:sp>
-      <p:pic>
-        <p:nvPicPr>
-          <p:cNvPr id="5" name="Content Placeholder 4">
-            <a:extLst>
-              <a:ext uri="{FF2B5EF4-FFF2-40B4-BE49-F238E27FC236}">
-                <a16:creationId xmlns:a16="http://schemas.microsoft.com/office/drawing/2014/main" id="{DDED5F9B-AC88-40FD-8351-871E9C62BFA0}"/>
-              </a:ext>
-            </a:extLst>
-          </p:cNvPr>
-          <p:cNvPicPr>
-            <a:picLocks noGrp="1" noChangeAspect="1"/>
-          </p:cNvPicPr>
-          <p:nvPr>
-            <p:ph idx="1"/>
-          </p:nvPr>
-        </p:nvPicPr>
-        <p:blipFill>
-          <a:blip r:embed="rId2">
-            <a:extLst>
-              <a:ext uri="{28A0092B-C50C-407E-A947-70E740481C1C}">
-                <a14:useLocalDpi xmlns:a14="http://schemas.microsoft.com/office/drawing/2010/main" val="0"/>
-              </a:ext>
-            </a:extLst>
-          </a:blip>
-          <a:stretch>
-            <a:fillRect/>
-          </a:stretch>
-        </p:blipFill>
-        <p:spPr>
-          <a:xfrm>
-            <a:off x="4130172" y="2249488"/>
-            <a:ext cx="3928482" cy="3541712"/>
-          </a:xfrm>
-        </p:spPr>
-      </p:pic>
-    </p:spTree>
-    <p:extLst>
-      <p:ext uri="{BB962C8B-B14F-4D97-AF65-F5344CB8AC3E}">
-        <p14:creationId xmlns:p14="http://schemas.microsoft.com/office/powerpoint/2010/main" val="2695114894"/>
-      </p:ext>
-    </p:extLst>
-  </p:cSld>
-  <p:clrMapOvr>
-    <a:masterClrMapping/>
-  </p:clrMapOvr>
-</p:sld>
-</file>
-
-<file path=ppt/slides/slide12.xml><?xml version="1.0" encoding="utf-8"?>
-<p:sld xmlns:a="http://schemas.openxmlformats.org/drawingml/2006/main" xmlns:r="http://schemas.openxmlformats.org/officeDocument/2006/relationships" xmlns:p="http://schemas.openxmlformats.org/presentationml/2006/main">
-  <p:cSld>
-    <p:spTree>
-      <p:nvGrpSpPr>
-        <p:cNvPr id="1" name=""/>
-        <p:cNvGrpSpPr/>
-        <p:nvPr/>
-      </p:nvGrpSpPr>
-      <p:grpSpPr>
-        <a:xfrm>
-          <a:off x="0" y="0"/>
-          <a:ext cx="0" cy="0"/>
-          <a:chOff x="0" y="0"/>
-          <a:chExt cx="0" cy="0"/>
-        </a:xfrm>
-      </p:grpSpPr>
-      <p:sp>
-        <p:nvSpPr>
-          <p:cNvPr id="2" name="Title 1">
-            <a:extLst>
-              <a:ext uri="{FF2B5EF4-FFF2-40B4-BE49-F238E27FC236}">
-                <a16:creationId xmlns:a16="http://schemas.microsoft.com/office/drawing/2014/main" id="{10EAC3E7-4FD5-4833-8940-5AEAE4A94798}"/>
-              </a:ext>
-            </a:extLst>
-          </p:cNvPr>
-          <p:cNvSpPr>
-            <a:spLocks noGrp="1"/>
-          </p:cNvSpPr>
-          <p:nvPr>
-            <p:ph type="title"/>
-          </p:nvPr>
-        </p:nvSpPr>
-        <p:spPr/>
-        <p:txBody>
-          <a:bodyPr/>
-          <a:lstStyle/>
-          <a:p>
-            <a:r>
-              <a:rPr lang="en-US" dirty="0"/>
-              <a:t>Finding a </a:t>
-            </a:r>
-            <a:r>
-              <a:rPr lang="en-US" dirty="0" err="1"/>
-              <a:t>DataSet</a:t>
-            </a:r>
-            <a:r>
-              <a:rPr lang="en-US" dirty="0"/>
-              <a:t> that I could utilize</a:t>
-            </a:r>
-          </a:p>
-        </p:txBody>
-      </p:sp>
-      <p:sp>
-        <p:nvSpPr>
-          <p:cNvPr id="3" name="Text Placeholder 2">
-            <a:extLst>
-              <a:ext uri="{FF2B5EF4-FFF2-40B4-BE49-F238E27FC236}">
-                <a16:creationId xmlns:a16="http://schemas.microsoft.com/office/drawing/2014/main" id="{A4FAA104-7254-40A6-8A1C-E047B675FE13}"/>
-              </a:ext>
-            </a:extLst>
-          </p:cNvPr>
-          <p:cNvSpPr>
-            <a:spLocks noGrp="1"/>
-          </p:cNvSpPr>
-          <p:nvPr>
-            <p:ph type="body" idx="1"/>
-          </p:nvPr>
-        </p:nvSpPr>
-        <p:spPr/>
-        <p:txBody>
-          <a:bodyPr>
-            <a:normAutofit/>
-          </a:bodyPr>
-          <a:lstStyle/>
-          <a:p>
-            <a:r>
-              <a:rPr lang="en-US" dirty="0"/>
-              <a:t>I adjusted my final project based on a dataset that I could find that correlated with technology in some way. </a:t>
-            </a:r>
-          </a:p>
-        </p:txBody>
-      </p:sp>
-    </p:spTree>
-    <p:extLst>
-      <p:ext uri="{BB962C8B-B14F-4D97-AF65-F5344CB8AC3E}">
-        <p14:creationId xmlns:p14="http://schemas.microsoft.com/office/powerpoint/2010/main" val="3225149342"/>
-      </p:ext>
-    </p:extLst>
-  </p:cSld>
-  <p:clrMapOvr>
-    <a:masterClrMapping/>
-  </p:clrMapOvr>
-</p:sld>
-</file>
-
-<file path=ppt/slides/slide13.xml><?xml version="1.0" encoding="utf-8"?>
+<file path=ppt/slides/slide8.xml><?xml version="1.0" encoding="utf-8"?>
 <p:sld xmlns:a="http://schemas.openxmlformats.org/drawingml/2006/main" xmlns:r="http://schemas.openxmlformats.org/officeDocument/2006/relationships" xmlns:p="http://schemas.openxmlformats.org/presentationml/2006/main">
   <p:cSld>
     <p:spTree>
@@ -14100,7 +15450,7 @@
 </p:sld>
 </file>
 
-<file path=ppt/slides/slide14.xml><?xml version="1.0" encoding="utf-8"?>
+<file path=ppt/slides/slide9.xml><?xml version="1.0" encoding="utf-8"?>
 <p:sld xmlns:a="http://schemas.openxmlformats.org/drawingml/2006/main" xmlns:r="http://schemas.openxmlformats.org/officeDocument/2006/relationships" xmlns:p="http://schemas.openxmlformats.org/presentationml/2006/main">
   <p:cSld>
     <p:spTree>
@@ -14200,1260 +15550,45 @@
 </p:sld>
 </file>
 
-<file path=ppt/slides/slide15.xml><?xml version="1.0" encoding="utf-8"?>
-<p:sld xmlns:a="http://schemas.openxmlformats.org/drawingml/2006/main" xmlns:r="http://schemas.openxmlformats.org/officeDocument/2006/relationships" xmlns:p="http://schemas.openxmlformats.org/presentationml/2006/main">
-  <p:cSld>
-    <p:spTree>
-      <p:nvGrpSpPr>
-        <p:cNvPr id="1" name=""/>
-        <p:cNvGrpSpPr/>
-        <p:nvPr/>
-      </p:nvGrpSpPr>
-      <p:grpSpPr>
-        <a:xfrm>
-          <a:off x="0" y="0"/>
-          <a:ext cx="0" cy="0"/>
-          <a:chOff x="0" y="0"/>
-          <a:chExt cx="0" cy="0"/>
-        </a:xfrm>
-      </p:grpSpPr>
-      <p:sp>
-        <p:nvSpPr>
-          <p:cNvPr id="2" name="Title 1">
-            <a:extLst>
-              <a:ext uri="{FF2B5EF4-FFF2-40B4-BE49-F238E27FC236}">
-                <a16:creationId xmlns:a16="http://schemas.microsoft.com/office/drawing/2014/main" id="{2C20C299-2256-424F-A895-44204C068478}"/>
-              </a:ext>
-            </a:extLst>
-          </p:cNvPr>
-          <p:cNvSpPr>
-            <a:spLocks noGrp="1"/>
-          </p:cNvSpPr>
-          <p:nvPr>
-            <p:ph type="title"/>
-          </p:nvPr>
-        </p:nvSpPr>
-        <p:spPr>
-          <a:xfrm>
-            <a:off x="1141411" y="1419227"/>
-            <a:ext cx="9906000" cy="1496166"/>
-          </a:xfrm>
-        </p:spPr>
-        <p:txBody>
-          <a:bodyPr/>
-          <a:lstStyle/>
-          <a:p>
-            <a:r>
-              <a:rPr lang="en-US" dirty="0"/>
-              <a:t>Further research…</a:t>
-            </a:r>
-          </a:p>
-        </p:txBody>
-      </p:sp>
-      <p:sp>
-        <p:nvSpPr>
-          <p:cNvPr id="3" name="Text Placeholder 2">
-            <a:extLst>
-              <a:ext uri="{FF2B5EF4-FFF2-40B4-BE49-F238E27FC236}">
-                <a16:creationId xmlns:a16="http://schemas.microsoft.com/office/drawing/2014/main" id="{690A6D5F-5B11-4011-866D-2818FD7D0396}"/>
-              </a:ext>
-            </a:extLst>
-          </p:cNvPr>
-          <p:cNvSpPr>
-            <a:spLocks noGrp="1"/>
-          </p:cNvSpPr>
-          <p:nvPr>
-            <p:ph type="body" idx="1"/>
-          </p:nvPr>
-        </p:nvSpPr>
-        <p:spPr>
-          <a:xfrm>
-            <a:off x="1141411" y="3253839"/>
-            <a:ext cx="9906000" cy="2545299"/>
-          </a:xfrm>
-        </p:spPr>
-        <p:txBody>
-          <a:bodyPr/>
-          <a:lstStyle/>
-          <a:p>
-            <a:r>
-              <a:rPr lang="en-US" dirty="0"/>
-              <a:t>evaluate if the number of language supported has any effect on user rating or rating content total. </a:t>
-            </a:r>
-          </a:p>
-          <a:p>
-            <a:endParaRPr lang="en-US" dirty="0"/>
-          </a:p>
-        </p:txBody>
-      </p:sp>
-    </p:spTree>
-    <p:extLst>
-      <p:ext uri="{BB962C8B-B14F-4D97-AF65-F5344CB8AC3E}">
-        <p14:creationId xmlns:p14="http://schemas.microsoft.com/office/powerpoint/2010/main" val="4185439474"/>
-      </p:ext>
-    </p:extLst>
-  </p:cSld>
-  <p:clrMapOvr>
-    <a:masterClrMapping/>
-  </p:clrMapOvr>
-</p:sld>
-</file>
-
-<file path=ppt/slides/slide16.xml><?xml version="1.0" encoding="utf-8"?>
-<p:sld xmlns:a="http://schemas.openxmlformats.org/drawingml/2006/main" xmlns:r="http://schemas.openxmlformats.org/officeDocument/2006/relationships" xmlns:p="http://schemas.openxmlformats.org/presentationml/2006/main">
-  <p:cSld>
-    <p:spTree>
-      <p:nvGrpSpPr>
-        <p:cNvPr id="1" name=""/>
-        <p:cNvGrpSpPr/>
-        <p:nvPr/>
-      </p:nvGrpSpPr>
-      <p:grpSpPr>
-        <a:xfrm>
-          <a:off x="0" y="0"/>
-          <a:ext cx="0" cy="0"/>
-          <a:chOff x="0" y="0"/>
-          <a:chExt cx="0" cy="0"/>
-        </a:xfrm>
-      </p:grpSpPr>
-      <p:sp>
-        <p:nvSpPr>
-          <p:cNvPr id="2" name="Title 1">
-            <a:extLst>
-              <a:ext uri="{FF2B5EF4-FFF2-40B4-BE49-F238E27FC236}">
-                <a16:creationId xmlns:a16="http://schemas.microsoft.com/office/drawing/2014/main" id="{2A783BB4-1440-4382-86F1-2AC2BCD4A898}"/>
-              </a:ext>
-            </a:extLst>
-          </p:cNvPr>
-          <p:cNvSpPr>
-            <a:spLocks noGrp="1"/>
-          </p:cNvSpPr>
-          <p:nvPr>
-            <p:ph type="title"/>
-          </p:nvPr>
-        </p:nvSpPr>
-        <p:spPr/>
-        <p:txBody>
-          <a:bodyPr/>
-          <a:lstStyle/>
-          <a:p>
-            <a:r>
-              <a:rPr lang="en-US" dirty="0"/>
-              <a:t>I had fun with this</a:t>
-            </a:r>
-          </a:p>
-        </p:txBody>
-      </p:sp>
-      <p:sp>
-        <p:nvSpPr>
-          <p:cNvPr id="3" name="Content Placeholder 2">
-            <a:extLst>
-              <a:ext uri="{FF2B5EF4-FFF2-40B4-BE49-F238E27FC236}">
-                <a16:creationId xmlns:a16="http://schemas.microsoft.com/office/drawing/2014/main" id="{4B8B57D2-C79D-4124-BF5D-24DF73749AC5}"/>
-              </a:ext>
-            </a:extLst>
-          </p:cNvPr>
-          <p:cNvSpPr>
-            <a:spLocks noGrp="1"/>
-          </p:cNvSpPr>
-          <p:nvPr>
-            <p:ph idx="1"/>
-          </p:nvPr>
-        </p:nvSpPr>
-        <p:spPr/>
-        <p:txBody>
-          <a:bodyPr/>
-          <a:lstStyle/>
-          <a:p>
-            <a:r>
-              <a:rPr lang="en-US" dirty="0"/>
-              <a:t>I had room to ask myself silly questions</a:t>
-            </a:r>
-          </a:p>
-          <a:p>
-            <a:r>
-              <a:rPr lang="en-US" dirty="0"/>
-              <a:t>I learned a little of what works and doesn’t work</a:t>
-            </a:r>
-          </a:p>
-          <a:p>
-            <a:endParaRPr lang="en-US" dirty="0"/>
-          </a:p>
-        </p:txBody>
-      </p:sp>
-    </p:spTree>
-    <p:extLst>
-      <p:ext uri="{BB962C8B-B14F-4D97-AF65-F5344CB8AC3E}">
-        <p14:creationId xmlns:p14="http://schemas.microsoft.com/office/powerpoint/2010/main" val="524065915"/>
-      </p:ext>
-    </p:extLst>
-  </p:cSld>
-  <p:clrMapOvr>
-    <a:masterClrMapping/>
-  </p:clrMapOvr>
-</p:sld>
-</file>
-
-<file path=ppt/slides/slide17.xml><?xml version="1.0" encoding="utf-8"?>
-<p:sld xmlns:a="http://schemas.openxmlformats.org/drawingml/2006/main" xmlns:r="http://schemas.openxmlformats.org/officeDocument/2006/relationships" xmlns:p="http://schemas.openxmlformats.org/presentationml/2006/main">
-  <p:cSld>
-    <p:spTree>
-      <p:nvGrpSpPr>
-        <p:cNvPr id="1" name=""/>
-        <p:cNvGrpSpPr/>
-        <p:nvPr/>
-      </p:nvGrpSpPr>
-      <p:grpSpPr>
-        <a:xfrm>
-          <a:off x="0" y="0"/>
-          <a:ext cx="0" cy="0"/>
-          <a:chOff x="0" y="0"/>
-          <a:chExt cx="0" cy="0"/>
-        </a:xfrm>
-      </p:grpSpPr>
-      <p:sp>
-        <p:nvSpPr>
-          <p:cNvPr id="2" name="Title 1">
-            <a:extLst>
-              <a:ext uri="{FF2B5EF4-FFF2-40B4-BE49-F238E27FC236}">
-                <a16:creationId xmlns:a16="http://schemas.microsoft.com/office/drawing/2014/main" id="{B02B8D67-62D6-4446-A2F2-C93F1B200A55}"/>
-              </a:ext>
-            </a:extLst>
-          </p:cNvPr>
-          <p:cNvSpPr>
-            <a:spLocks noGrp="1"/>
-          </p:cNvSpPr>
-          <p:nvPr>
-            <p:ph type="title"/>
-          </p:nvPr>
-        </p:nvSpPr>
-        <p:spPr/>
-        <p:txBody>
-          <a:bodyPr/>
-          <a:lstStyle/>
-          <a:p>
-            <a:r>
-              <a:rPr lang="en-US" dirty="0"/>
-              <a:t>Summary</a:t>
-            </a:r>
-          </a:p>
-        </p:txBody>
-      </p:sp>
-      <p:sp>
-        <p:nvSpPr>
-          <p:cNvPr id="3" name="Content Placeholder 2">
-            <a:extLst>
-              <a:ext uri="{FF2B5EF4-FFF2-40B4-BE49-F238E27FC236}">
-                <a16:creationId xmlns:a16="http://schemas.microsoft.com/office/drawing/2014/main" id="{516B5800-5561-49B2-84F6-B9D14862EC8A}"/>
-              </a:ext>
-            </a:extLst>
-          </p:cNvPr>
-          <p:cNvSpPr>
-            <a:spLocks noGrp="1"/>
-          </p:cNvSpPr>
-          <p:nvPr>
-            <p:ph idx="1"/>
-          </p:nvPr>
-        </p:nvSpPr>
-        <p:spPr/>
-        <p:txBody>
-          <a:bodyPr/>
-          <a:lstStyle/>
-          <a:p>
-            <a:r>
-              <a:rPr lang="en-US" dirty="0"/>
-              <a:t>There are a total of 7197 apps on this data set collected in July 2017</a:t>
-            </a:r>
-          </a:p>
-          <a:p>
-            <a:endParaRPr lang="en-US" dirty="0"/>
-          </a:p>
-          <a:p>
-            <a:endParaRPr lang="en-US" dirty="0"/>
-          </a:p>
-        </p:txBody>
-      </p:sp>
-    </p:spTree>
-    <p:extLst>
-      <p:ext uri="{BB962C8B-B14F-4D97-AF65-F5344CB8AC3E}">
-        <p14:creationId xmlns:p14="http://schemas.microsoft.com/office/powerpoint/2010/main" val="1055199505"/>
-      </p:ext>
-    </p:extLst>
-  </p:cSld>
-  <p:clrMapOvr>
-    <a:masterClrMapping/>
-  </p:clrMapOvr>
-</p:sld>
-</file>
-
-<file path=ppt/slides/slide2.xml><?xml version="1.0" encoding="utf-8"?>
-<p:sld xmlns:a="http://schemas.openxmlformats.org/drawingml/2006/main" xmlns:r="http://schemas.openxmlformats.org/officeDocument/2006/relationships" xmlns:p="http://schemas.openxmlformats.org/presentationml/2006/main">
-  <p:cSld>
-    <p:spTree>
-      <p:nvGrpSpPr>
-        <p:cNvPr id="1" name=""/>
-        <p:cNvGrpSpPr/>
-        <p:nvPr/>
-      </p:nvGrpSpPr>
-      <p:grpSpPr>
-        <a:xfrm>
-          <a:off x="0" y="0"/>
-          <a:ext cx="0" cy="0"/>
-          <a:chOff x="0" y="0"/>
-          <a:chExt cx="0" cy="0"/>
-        </a:xfrm>
-      </p:grpSpPr>
-      <p:sp>
-        <p:nvSpPr>
-          <p:cNvPr id="2" name="Title 1">
-            <a:extLst>
-              <a:ext uri="{FF2B5EF4-FFF2-40B4-BE49-F238E27FC236}">
-                <a16:creationId xmlns:a16="http://schemas.microsoft.com/office/drawing/2014/main" id="{8525D924-80AD-4FFF-85C0-F5C08F39AFDC}"/>
-              </a:ext>
-            </a:extLst>
-          </p:cNvPr>
-          <p:cNvSpPr>
-            <a:spLocks noGrp="1"/>
-          </p:cNvSpPr>
-          <p:nvPr>
-            <p:ph type="title"/>
-          </p:nvPr>
-        </p:nvSpPr>
-        <p:spPr/>
-        <p:txBody>
-          <a:bodyPr/>
-          <a:lstStyle/>
-          <a:p>
-            <a:endParaRPr lang="en-US"/>
-          </a:p>
-        </p:txBody>
-      </p:sp>
-      <p:sp>
-        <p:nvSpPr>
-          <p:cNvPr id="3" name="Content Placeholder 2">
-            <a:extLst>
-              <a:ext uri="{FF2B5EF4-FFF2-40B4-BE49-F238E27FC236}">
-                <a16:creationId xmlns:a16="http://schemas.microsoft.com/office/drawing/2014/main" id="{C0388CCF-C988-401D-A73A-46921182F5DE}"/>
-              </a:ext>
-            </a:extLst>
-          </p:cNvPr>
-          <p:cNvSpPr>
-            <a:spLocks noGrp="1"/>
-          </p:cNvSpPr>
-          <p:nvPr>
-            <p:ph idx="1"/>
-          </p:nvPr>
-        </p:nvSpPr>
-        <p:spPr/>
-        <p:txBody>
-          <a:bodyPr>
-            <a:normAutofit fontScale="92500" lnSpcReduction="20000"/>
-          </a:bodyPr>
-          <a:lstStyle/>
-          <a:p>
-            <a:r>
-              <a:rPr lang="en-US" dirty="0"/>
-              <a:t>I did not have many preconceived notions when it came to mobile apps.</a:t>
-            </a:r>
-          </a:p>
-          <a:p>
-            <a:r>
-              <a:rPr lang="en-US" dirty="0"/>
-              <a:t>I had to look up what </a:t>
-            </a:r>
-            <a:r>
-              <a:rPr lang="en-US" dirty="0" err="1"/>
-              <a:t>cont_rating</a:t>
-            </a:r>
-            <a:r>
-              <a:rPr lang="en-US" dirty="0"/>
-              <a:t> was. </a:t>
-            </a:r>
-          </a:p>
-          <a:p>
-            <a:r>
-              <a:rPr lang="en-US" dirty="0"/>
-              <a:t>I was not surprised to see that there are more mobile game apps than any other category</a:t>
-            </a:r>
-          </a:p>
-          <a:p>
-            <a:r>
-              <a:rPr lang="en-US" dirty="0"/>
-              <a:t>I was surprised to see a price for one shopping app.  When you think of a shopping app you think of amazon or </a:t>
-            </a:r>
-            <a:r>
-              <a:rPr lang="en-US" dirty="0" err="1"/>
-              <a:t>ebay</a:t>
-            </a:r>
-            <a:r>
-              <a:rPr lang="en-US" dirty="0"/>
-              <a:t>.  </a:t>
-            </a:r>
-          </a:p>
-          <a:p>
-            <a:r>
-              <a:rPr lang="en-US" dirty="0"/>
-              <a:t>I don’t remember ever seeing any app at 300 dollars. I suppose it was not that surprising that it’s an education app. </a:t>
-            </a:r>
-          </a:p>
-          <a:p>
-            <a:endParaRPr lang="en-US" dirty="0"/>
-          </a:p>
-        </p:txBody>
-      </p:sp>
-    </p:spTree>
-    <p:extLst>
-      <p:ext uri="{BB962C8B-B14F-4D97-AF65-F5344CB8AC3E}">
-        <p14:creationId xmlns:p14="http://schemas.microsoft.com/office/powerpoint/2010/main" val="215026579"/>
-      </p:ext>
-    </p:extLst>
-  </p:cSld>
-  <p:clrMapOvr>
-    <a:masterClrMapping/>
-  </p:clrMapOvr>
-</p:sld>
-</file>
-
-<file path=ppt/slides/slide3.xml><?xml version="1.0" encoding="utf-8"?>
-<p:sld xmlns:a="http://schemas.openxmlformats.org/drawingml/2006/main" xmlns:r="http://schemas.openxmlformats.org/officeDocument/2006/relationships" xmlns:p="http://schemas.openxmlformats.org/presentationml/2006/main">
-  <p:cSld>
-    <p:spTree>
-      <p:nvGrpSpPr>
-        <p:cNvPr id="1" name=""/>
-        <p:cNvGrpSpPr/>
-        <p:nvPr/>
-      </p:nvGrpSpPr>
-      <p:grpSpPr>
-        <a:xfrm>
-          <a:off x="0" y="0"/>
-          <a:ext cx="0" cy="0"/>
-          <a:chOff x="0" y="0"/>
-          <a:chExt cx="0" cy="0"/>
-        </a:xfrm>
-      </p:grpSpPr>
-      <p:sp>
-        <p:nvSpPr>
-          <p:cNvPr id="2" name="Title 1">
-            <a:extLst>
-              <a:ext uri="{FF2B5EF4-FFF2-40B4-BE49-F238E27FC236}">
-                <a16:creationId xmlns:a16="http://schemas.microsoft.com/office/drawing/2014/main" id="{0213E2F5-EFEA-4D05-B809-6B08EAE52A40}"/>
-              </a:ext>
-            </a:extLst>
-          </p:cNvPr>
-          <p:cNvSpPr>
-            <a:spLocks noGrp="1"/>
-          </p:cNvSpPr>
-          <p:nvPr>
-            <p:ph type="title"/>
-          </p:nvPr>
-        </p:nvSpPr>
-        <p:spPr/>
-        <p:txBody>
-          <a:bodyPr/>
-          <a:lstStyle/>
-          <a:p>
-            <a:r>
-              <a:rPr lang="en-US" dirty="0"/>
-              <a:t>Quick Glance </a:t>
-            </a:r>
-          </a:p>
-        </p:txBody>
-      </p:sp>
-      <p:pic>
-        <p:nvPicPr>
-          <p:cNvPr id="16" name="Content Placeholder 15">
-            <a:extLst>
-              <a:ext uri="{FF2B5EF4-FFF2-40B4-BE49-F238E27FC236}">
-                <a16:creationId xmlns:a16="http://schemas.microsoft.com/office/drawing/2014/main" id="{624B4E06-A1E5-4180-800A-A996D7DE58B1}"/>
-              </a:ext>
-            </a:extLst>
-          </p:cNvPr>
-          <p:cNvPicPr>
-            <a:picLocks noGrp="1" noChangeAspect="1"/>
-          </p:cNvPicPr>
-          <p:nvPr>
-            <p:ph idx="1"/>
-          </p:nvPr>
-        </p:nvPicPr>
-        <p:blipFill>
-          <a:blip r:embed="rId2">
-            <a:extLst>
-              <a:ext uri="{28A0092B-C50C-407E-A947-70E740481C1C}">
-                <a14:useLocalDpi xmlns:a14="http://schemas.microsoft.com/office/drawing/2010/main" val="0"/>
-              </a:ext>
-            </a:extLst>
-          </a:blip>
-          <a:stretch>
-            <a:fillRect/>
-          </a:stretch>
-        </p:blipFill>
-        <p:spPr>
-          <a:xfrm>
-            <a:off x="719847" y="2397868"/>
-            <a:ext cx="10919298" cy="1527244"/>
-          </a:xfrm>
-        </p:spPr>
-      </p:pic>
-    </p:spTree>
-    <p:extLst>
-      <p:ext uri="{BB962C8B-B14F-4D97-AF65-F5344CB8AC3E}">
-        <p14:creationId xmlns:p14="http://schemas.microsoft.com/office/powerpoint/2010/main" val="3739772431"/>
-      </p:ext>
-    </p:extLst>
-  </p:cSld>
-  <p:clrMapOvr>
-    <a:masterClrMapping/>
-  </p:clrMapOvr>
-</p:sld>
-</file>
-
-<file path=ppt/slides/slide4.xml><?xml version="1.0" encoding="utf-8"?>
-<p:sld xmlns:a="http://schemas.openxmlformats.org/drawingml/2006/main" xmlns:r="http://schemas.openxmlformats.org/officeDocument/2006/relationships" xmlns:p="http://schemas.openxmlformats.org/presentationml/2006/main">
-  <p:cSld>
-    <p:spTree>
-      <p:nvGrpSpPr>
-        <p:cNvPr id="1" name=""/>
-        <p:cNvGrpSpPr/>
-        <p:nvPr/>
-      </p:nvGrpSpPr>
-      <p:grpSpPr>
-        <a:xfrm>
-          <a:off x="0" y="0"/>
-          <a:ext cx="0" cy="0"/>
-          <a:chOff x="0" y="0"/>
-          <a:chExt cx="0" cy="0"/>
-        </a:xfrm>
-      </p:grpSpPr>
-      <p:sp>
-        <p:nvSpPr>
-          <p:cNvPr id="2" name="Title 1">
-            <a:extLst>
-              <a:ext uri="{FF2B5EF4-FFF2-40B4-BE49-F238E27FC236}">
-                <a16:creationId xmlns:a16="http://schemas.microsoft.com/office/drawing/2014/main" id="{A1F5FAFD-1189-4BAA-9F13-BD3E26E4EF4E}"/>
-              </a:ext>
-            </a:extLst>
-          </p:cNvPr>
-          <p:cNvSpPr>
-            <a:spLocks noGrp="1"/>
-          </p:cNvSpPr>
-          <p:nvPr>
-            <p:ph type="title"/>
-          </p:nvPr>
-        </p:nvSpPr>
-        <p:spPr/>
-        <p:txBody>
-          <a:bodyPr/>
-          <a:lstStyle/>
-          <a:p>
-            <a:r>
-              <a:rPr lang="en-US" dirty="0"/>
-              <a:t>Checking my Data</a:t>
-            </a:r>
-          </a:p>
-        </p:txBody>
-      </p:sp>
-      <p:sp>
-        <p:nvSpPr>
-          <p:cNvPr id="3" name="Picture Placeholder 2">
-            <a:extLst>
-              <a:ext uri="{FF2B5EF4-FFF2-40B4-BE49-F238E27FC236}">
-                <a16:creationId xmlns:a16="http://schemas.microsoft.com/office/drawing/2014/main" id="{B74ECC50-B122-44C0-801E-2A78BFB6E457}"/>
-              </a:ext>
-            </a:extLst>
-          </p:cNvPr>
-          <p:cNvSpPr>
-            <a:spLocks noGrp="1"/>
-          </p:cNvSpPr>
-          <p:nvPr>
-            <p:ph type="pic" idx="1"/>
-          </p:nvPr>
-        </p:nvSpPr>
-        <p:spPr/>
-      </p:sp>
-      <p:sp>
-        <p:nvSpPr>
-          <p:cNvPr id="4" name="Text Placeholder 3">
-            <a:extLst>
-              <a:ext uri="{FF2B5EF4-FFF2-40B4-BE49-F238E27FC236}">
-                <a16:creationId xmlns:a16="http://schemas.microsoft.com/office/drawing/2014/main" id="{43D53F94-92CC-422F-A7D8-6C893F2BB70D}"/>
-              </a:ext>
-            </a:extLst>
-          </p:cNvPr>
-          <p:cNvSpPr>
-            <a:spLocks noGrp="1"/>
-          </p:cNvSpPr>
-          <p:nvPr>
-            <p:ph type="body" sz="half" idx="2"/>
-          </p:nvPr>
-        </p:nvSpPr>
-        <p:spPr/>
-        <p:txBody>
-          <a:bodyPr/>
-          <a:lstStyle/>
-          <a:p>
-            <a:r>
-              <a:rPr lang="en-US" dirty="0"/>
-              <a:t>Have not found any null characters or NAN</a:t>
-            </a:r>
-          </a:p>
-          <a:p>
-            <a:r>
-              <a:rPr lang="en-US" dirty="0"/>
-              <a:t>The non English text has been my only real aversion</a:t>
-            </a:r>
-          </a:p>
-          <a:p>
-            <a:endParaRPr lang="en-US" dirty="0"/>
-          </a:p>
-        </p:txBody>
-      </p:sp>
-    </p:spTree>
-    <p:extLst>
-      <p:ext uri="{BB962C8B-B14F-4D97-AF65-F5344CB8AC3E}">
-        <p14:creationId xmlns:p14="http://schemas.microsoft.com/office/powerpoint/2010/main" val="2270860919"/>
-      </p:ext>
-    </p:extLst>
-  </p:cSld>
-  <p:clrMapOvr>
-    <a:masterClrMapping/>
-  </p:clrMapOvr>
-</p:sld>
-</file>
-
-<file path=ppt/slides/slide5.xml><?xml version="1.0" encoding="utf-8"?>
-<p:sld xmlns:a="http://schemas.openxmlformats.org/drawingml/2006/main" xmlns:r="http://schemas.openxmlformats.org/officeDocument/2006/relationships" xmlns:p="http://schemas.openxmlformats.org/presentationml/2006/main">
-  <p:cSld>
-    <p:spTree>
-      <p:nvGrpSpPr>
-        <p:cNvPr id="1" name=""/>
-        <p:cNvGrpSpPr/>
-        <p:nvPr/>
-      </p:nvGrpSpPr>
-      <p:grpSpPr>
-        <a:xfrm>
-          <a:off x="0" y="0"/>
-          <a:ext cx="0" cy="0"/>
-          <a:chOff x="0" y="0"/>
-          <a:chExt cx="0" cy="0"/>
-        </a:xfrm>
-      </p:grpSpPr>
-      <p:sp>
-        <p:nvSpPr>
-          <p:cNvPr id="2" name="Title 1">
-            <a:extLst>
-              <a:ext uri="{FF2B5EF4-FFF2-40B4-BE49-F238E27FC236}">
-                <a16:creationId xmlns:a16="http://schemas.microsoft.com/office/drawing/2014/main" id="{91ED8CB7-73BA-47F9-851A-B2F138D7B836}"/>
-              </a:ext>
-            </a:extLst>
-          </p:cNvPr>
-          <p:cNvSpPr>
-            <a:spLocks noGrp="1"/>
-          </p:cNvSpPr>
-          <p:nvPr>
-            <p:ph type="title"/>
-          </p:nvPr>
-        </p:nvSpPr>
-        <p:spPr/>
-        <p:txBody>
-          <a:bodyPr/>
-          <a:lstStyle/>
-          <a:p>
-            <a:r>
-              <a:rPr lang="en-US" dirty="0"/>
-              <a:t>Cleaning</a:t>
-            </a:r>
-          </a:p>
-        </p:txBody>
-      </p:sp>
-      <p:sp>
-        <p:nvSpPr>
-          <p:cNvPr id="4" name="Text Placeholder 3">
-            <a:extLst>
-              <a:ext uri="{FF2B5EF4-FFF2-40B4-BE49-F238E27FC236}">
-                <a16:creationId xmlns:a16="http://schemas.microsoft.com/office/drawing/2014/main" id="{A698D26E-004C-49D3-A37E-CAE3D89363AA}"/>
-              </a:ext>
-            </a:extLst>
-          </p:cNvPr>
-          <p:cNvSpPr>
-            <a:spLocks noGrp="1"/>
-          </p:cNvSpPr>
-          <p:nvPr>
-            <p:ph type="body" sz="half" idx="2"/>
-          </p:nvPr>
-        </p:nvSpPr>
-        <p:spPr/>
-        <p:txBody>
-          <a:bodyPr/>
-          <a:lstStyle/>
-          <a:p>
-            <a:r>
-              <a:rPr lang="en-US" dirty="0"/>
-              <a:t>For each genre these are the highest priced apps.  </a:t>
-            </a:r>
-          </a:p>
-          <a:p>
-            <a:endParaRPr lang="en-US" dirty="0"/>
-          </a:p>
-          <a:p>
-            <a:r>
-              <a:rPr lang="en-US" dirty="0"/>
-              <a:t>There are over 7000 records and I knew I wanted to try and tackle translating these. </a:t>
-            </a:r>
-          </a:p>
-        </p:txBody>
-      </p:sp>
-      <p:pic>
-        <p:nvPicPr>
-          <p:cNvPr id="10" name="Content Placeholder 9">
-            <a:extLst>
-              <a:ext uri="{FF2B5EF4-FFF2-40B4-BE49-F238E27FC236}">
-                <a16:creationId xmlns:a16="http://schemas.microsoft.com/office/drawing/2014/main" id="{35AC9180-7BF0-4FA8-BE40-86F251369683}"/>
-              </a:ext>
-            </a:extLst>
-          </p:cNvPr>
-          <p:cNvPicPr>
-            <a:picLocks noGrp="1" noChangeAspect="1"/>
-          </p:cNvPicPr>
-          <p:nvPr>
-            <p:ph idx="1"/>
-          </p:nvPr>
-        </p:nvPicPr>
-        <p:blipFill>
-          <a:blip r:embed="rId2">
-            <a:extLst>
-              <a:ext uri="{28A0092B-C50C-407E-A947-70E740481C1C}">
-                <a14:useLocalDpi xmlns:a14="http://schemas.microsoft.com/office/drawing/2010/main" val="0"/>
-              </a:ext>
-            </a:extLst>
-          </a:blip>
-          <a:stretch>
-            <a:fillRect/>
-          </a:stretch>
-        </p:blipFill>
-        <p:spPr>
-          <a:xfrm>
-            <a:off x="5924256" y="592138"/>
-            <a:ext cx="4355100" cy="5199062"/>
-          </a:xfrm>
-        </p:spPr>
-      </p:pic>
-    </p:spTree>
-    <p:extLst>
-      <p:ext uri="{BB962C8B-B14F-4D97-AF65-F5344CB8AC3E}">
-        <p14:creationId xmlns:p14="http://schemas.microsoft.com/office/powerpoint/2010/main" val="3690492194"/>
-      </p:ext>
-    </p:extLst>
-  </p:cSld>
-  <p:clrMapOvr>
-    <a:masterClrMapping/>
-  </p:clrMapOvr>
-</p:sld>
-</file>
-
-<file path=ppt/slides/slide6.xml><?xml version="1.0" encoding="utf-8"?>
-<p:sld xmlns:a="http://schemas.openxmlformats.org/drawingml/2006/main" xmlns:r="http://schemas.openxmlformats.org/officeDocument/2006/relationships" xmlns:p="http://schemas.openxmlformats.org/presentationml/2006/main">
-  <p:cSld>
-    <p:spTree>
-      <p:nvGrpSpPr>
-        <p:cNvPr id="1" name=""/>
-        <p:cNvGrpSpPr/>
-        <p:nvPr/>
-      </p:nvGrpSpPr>
-      <p:grpSpPr>
-        <a:xfrm>
-          <a:off x="0" y="0"/>
-          <a:ext cx="0" cy="0"/>
-          <a:chOff x="0" y="0"/>
-          <a:chExt cx="0" cy="0"/>
-        </a:xfrm>
-      </p:grpSpPr>
-      <p:sp>
-        <p:nvSpPr>
-          <p:cNvPr id="2" name="Title 1">
-            <a:extLst>
-              <a:ext uri="{FF2B5EF4-FFF2-40B4-BE49-F238E27FC236}">
-                <a16:creationId xmlns:a16="http://schemas.microsoft.com/office/drawing/2014/main" id="{80D89318-BB38-43FA-8990-6D2785E8984E}"/>
-              </a:ext>
-            </a:extLst>
-          </p:cNvPr>
-          <p:cNvSpPr>
-            <a:spLocks noGrp="1"/>
-          </p:cNvSpPr>
-          <p:nvPr>
-            <p:ph type="title"/>
-          </p:nvPr>
-        </p:nvSpPr>
-        <p:spPr/>
-        <p:txBody>
-          <a:bodyPr/>
-          <a:lstStyle/>
-          <a:p>
-            <a:r>
-              <a:rPr lang="en-US" dirty="0"/>
-              <a:t>Comparison</a:t>
-            </a:r>
-          </a:p>
-        </p:txBody>
-      </p:sp>
-      <p:sp>
-        <p:nvSpPr>
-          <p:cNvPr id="3" name="Text Placeholder 2">
-            <a:extLst>
-              <a:ext uri="{FF2B5EF4-FFF2-40B4-BE49-F238E27FC236}">
-                <a16:creationId xmlns:a16="http://schemas.microsoft.com/office/drawing/2014/main" id="{597B88FC-A816-48CD-99CB-F14186F04A02}"/>
-              </a:ext>
-            </a:extLst>
-          </p:cNvPr>
-          <p:cNvSpPr>
-            <a:spLocks noGrp="1"/>
-          </p:cNvSpPr>
-          <p:nvPr>
-            <p:ph type="body" idx="1"/>
-          </p:nvPr>
-        </p:nvSpPr>
-        <p:spPr/>
-        <p:txBody>
-          <a:bodyPr/>
-          <a:lstStyle/>
-          <a:p>
-            <a:endParaRPr lang="en-US"/>
-          </a:p>
-        </p:txBody>
-      </p:sp>
-      <p:pic>
-        <p:nvPicPr>
-          <p:cNvPr id="8" name="Content Placeholder 7">
-            <a:extLst>
-              <a:ext uri="{FF2B5EF4-FFF2-40B4-BE49-F238E27FC236}">
-                <a16:creationId xmlns:a16="http://schemas.microsoft.com/office/drawing/2014/main" id="{EC37CDDB-8389-47DA-84B9-D749C263653D}"/>
-              </a:ext>
-            </a:extLst>
-          </p:cNvPr>
-          <p:cNvPicPr>
-            <a:picLocks noGrp="1" noChangeAspect="1"/>
-          </p:cNvPicPr>
-          <p:nvPr>
-            <p:ph sz="half" idx="2"/>
-          </p:nvPr>
-        </p:nvPicPr>
-        <p:blipFill>
-          <a:blip r:embed="rId2">
-            <a:extLst>
-              <a:ext uri="{28A0092B-C50C-407E-A947-70E740481C1C}">
-                <a14:useLocalDpi xmlns:a14="http://schemas.microsoft.com/office/drawing/2010/main" val="0"/>
-              </a:ext>
-            </a:extLst>
-          </a:blip>
-          <a:stretch>
-            <a:fillRect/>
-          </a:stretch>
-        </p:blipFill>
-        <p:spPr>
-          <a:xfrm>
-            <a:off x="1141411" y="2135998"/>
-            <a:ext cx="3745149" cy="4470911"/>
-          </a:xfrm>
-        </p:spPr>
-      </p:pic>
-      <p:sp>
-        <p:nvSpPr>
-          <p:cNvPr id="5" name="Text Placeholder 4">
-            <a:extLst>
-              <a:ext uri="{FF2B5EF4-FFF2-40B4-BE49-F238E27FC236}">
-                <a16:creationId xmlns:a16="http://schemas.microsoft.com/office/drawing/2014/main" id="{51873F4D-BF77-4ADD-B792-ECF7DB2DDC2C}"/>
-              </a:ext>
-            </a:extLst>
-          </p:cNvPr>
-          <p:cNvSpPr>
-            <a:spLocks noGrp="1"/>
-          </p:cNvSpPr>
-          <p:nvPr>
-            <p:ph type="body" sz="quarter" idx="3"/>
-          </p:nvPr>
-        </p:nvSpPr>
-        <p:spPr/>
-        <p:txBody>
-          <a:bodyPr/>
-          <a:lstStyle/>
-          <a:p>
-            <a:endParaRPr lang="en-US"/>
-          </a:p>
-        </p:txBody>
-      </p:sp>
-      <p:pic>
-        <p:nvPicPr>
-          <p:cNvPr id="10" name="Content Placeholder 9">
-            <a:extLst>
-              <a:ext uri="{FF2B5EF4-FFF2-40B4-BE49-F238E27FC236}">
-                <a16:creationId xmlns:a16="http://schemas.microsoft.com/office/drawing/2014/main" id="{159C3295-8AA6-476A-8385-AA28D3BA1467}"/>
-              </a:ext>
-            </a:extLst>
-          </p:cNvPr>
-          <p:cNvPicPr>
-            <a:picLocks noGrp="1" noChangeAspect="1"/>
-          </p:cNvPicPr>
-          <p:nvPr>
-            <p:ph sz="quarter" idx="4"/>
-          </p:nvPr>
-        </p:nvPicPr>
-        <p:blipFill>
-          <a:blip r:embed="rId3">
-            <a:extLst>
-              <a:ext uri="{28A0092B-C50C-407E-A947-70E740481C1C}">
-                <a14:useLocalDpi xmlns:a14="http://schemas.microsoft.com/office/drawing/2010/main" val="0"/>
-              </a:ext>
-            </a:extLst>
-          </a:blip>
-          <a:stretch>
-            <a:fillRect/>
-          </a:stretch>
-        </p:blipFill>
-        <p:spPr>
-          <a:xfrm>
-            <a:off x="5827730" y="2117607"/>
-            <a:ext cx="5717884" cy="4465525"/>
-          </a:xfrm>
-          <a:solidFill>
-            <a:schemeClr val="tx1">
-              <a:lumMod val="95000"/>
-            </a:schemeClr>
-          </a:solidFill>
-        </p:spPr>
-      </p:pic>
-    </p:spTree>
-    <p:extLst>
-      <p:ext uri="{BB962C8B-B14F-4D97-AF65-F5344CB8AC3E}">
-        <p14:creationId xmlns:p14="http://schemas.microsoft.com/office/powerpoint/2010/main" val="1984394337"/>
-      </p:ext>
-    </p:extLst>
-  </p:cSld>
-  <p:clrMapOvr>
-    <a:masterClrMapping/>
-  </p:clrMapOvr>
-</p:sld>
-</file>
-
-<file path=ppt/slides/slide7.xml><?xml version="1.0" encoding="utf-8"?>
-<p:sld xmlns:a="http://schemas.openxmlformats.org/drawingml/2006/main" xmlns:r="http://schemas.openxmlformats.org/officeDocument/2006/relationships" xmlns:p="http://schemas.openxmlformats.org/presentationml/2006/main">
-  <p:cSld>
-    <p:spTree>
-      <p:nvGrpSpPr>
-        <p:cNvPr id="1" name=""/>
-        <p:cNvGrpSpPr/>
-        <p:nvPr/>
-      </p:nvGrpSpPr>
-      <p:grpSpPr>
-        <a:xfrm>
-          <a:off x="0" y="0"/>
-          <a:ext cx="0" cy="0"/>
-          <a:chOff x="0" y="0"/>
-          <a:chExt cx="0" cy="0"/>
-        </a:xfrm>
-      </p:grpSpPr>
-      <p:sp>
-        <p:nvSpPr>
-          <p:cNvPr id="2" name="Title 1">
-            <a:extLst>
-              <a:ext uri="{FF2B5EF4-FFF2-40B4-BE49-F238E27FC236}">
-                <a16:creationId xmlns:a16="http://schemas.microsoft.com/office/drawing/2014/main" id="{192CFDE2-11BB-4EA3-8D71-7E74FA301359}"/>
-              </a:ext>
-            </a:extLst>
-          </p:cNvPr>
-          <p:cNvSpPr>
-            <a:spLocks noGrp="1"/>
-          </p:cNvSpPr>
-          <p:nvPr>
-            <p:ph type="title"/>
-          </p:nvPr>
-        </p:nvSpPr>
-        <p:spPr/>
-        <p:txBody>
-          <a:bodyPr/>
-          <a:lstStyle/>
-          <a:p>
-            <a:r>
-              <a:rPr lang="en-US" dirty="0"/>
-              <a:t>Analyze</a:t>
-            </a:r>
-          </a:p>
-        </p:txBody>
-      </p:sp>
-      <p:sp>
-        <p:nvSpPr>
-          <p:cNvPr id="3" name="Content Placeholder 2">
-            <a:extLst>
-              <a:ext uri="{FF2B5EF4-FFF2-40B4-BE49-F238E27FC236}">
-                <a16:creationId xmlns:a16="http://schemas.microsoft.com/office/drawing/2014/main" id="{2D4FD7CB-2900-4820-AACC-46F55032E8CE}"/>
-              </a:ext>
-            </a:extLst>
-          </p:cNvPr>
-          <p:cNvSpPr>
-            <a:spLocks noGrp="1"/>
-          </p:cNvSpPr>
-          <p:nvPr>
-            <p:ph idx="1"/>
-          </p:nvPr>
-        </p:nvSpPr>
-        <p:spPr/>
-        <p:txBody>
-          <a:bodyPr/>
-          <a:lstStyle/>
-          <a:p>
-            <a:r>
-              <a:rPr lang="en-US" dirty="0"/>
-              <a:t>I used Matplotlib and Seaborn to analyze and graph some of what I found. </a:t>
-            </a:r>
-          </a:p>
-        </p:txBody>
-      </p:sp>
-    </p:spTree>
-    <p:extLst>
-      <p:ext uri="{BB962C8B-B14F-4D97-AF65-F5344CB8AC3E}">
-        <p14:creationId xmlns:p14="http://schemas.microsoft.com/office/powerpoint/2010/main" val="2366092075"/>
-      </p:ext>
-    </p:extLst>
-  </p:cSld>
-  <p:clrMapOvr>
-    <a:masterClrMapping/>
-  </p:clrMapOvr>
-</p:sld>
-</file>
-
-<file path=ppt/slides/slide8.xml><?xml version="1.0" encoding="utf-8"?>
-<p:sld xmlns:a="http://schemas.openxmlformats.org/drawingml/2006/main" xmlns:r="http://schemas.openxmlformats.org/officeDocument/2006/relationships" xmlns:p="http://schemas.openxmlformats.org/presentationml/2006/main">
-  <p:cSld>
-    <p:spTree>
-      <p:nvGrpSpPr>
-        <p:cNvPr id="1" name=""/>
-        <p:cNvGrpSpPr/>
-        <p:nvPr/>
-      </p:nvGrpSpPr>
-      <p:grpSpPr>
-        <a:xfrm>
-          <a:off x="0" y="0"/>
-          <a:ext cx="0" cy="0"/>
-          <a:chOff x="0" y="0"/>
-          <a:chExt cx="0" cy="0"/>
-        </a:xfrm>
-      </p:grpSpPr>
-      <p:sp>
-        <p:nvSpPr>
-          <p:cNvPr id="2" name="Title 1">
-            <a:extLst>
-              <a:ext uri="{FF2B5EF4-FFF2-40B4-BE49-F238E27FC236}">
-                <a16:creationId xmlns:a16="http://schemas.microsoft.com/office/drawing/2014/main" id="{EBE29AA4-268B-47A9-8631-09BF8343B9D0}"/>
-              </a:ext>
-            </a:extLst>
-          </p:cNvPr>
-          <p:cNvSpPr>
-            <a:spLocks noGrp="1"/>
-          </p:cNvSpPr>
-          <p:nvPr>
-            <p:ph type="title"/>
-          </p:nvPr>
-        </p:nvSpPr>
-        <p:spPr/>
-        <p:txBody>
-          <a:bodyPr/>
-          <a:lstStyle/>
-          <a:p>
-            <a:r>
-              <a:rPr lang="en-US" dirty="0"/>
-              <a:t>Findings</a:t>
-            </a:r>
-          </a:p>
-        </p:txBody>
-      </p:sp>
-      <p:pic>
-        <p:nvPicPr>
-          <p:cNvPr id="5" name="Content Placeholder 4">
-            <a:extLst>
-              <a:ext uri="{FF2B5EF4-FFF2-40B4-BE49-F238E27FC236}">
-                <a16:creationId xmlns:a16="http://schemas.microsoft.com/office/drawing/2014/main" id="{87449C73-6DE8-4144-8FF8-2DFC45DDEAD0}"/>
-              </a:ext>
-            </a:extLst>
-          </p:cNvPr>
-          <p:cNvPicPr>
-            <a:picLocks noGrp="1" noChangeAspect="1"/>
-          </p:cNvPicPr>
-          <p:nvPr>
-            <p:ph idx="1"/>
-          </p:nvPr>
-        </p:nvPicPr>
-        <p:blipFill>
-          <a:blip r:embed="rId3">
-            <a:extLst>
-              <a:ext uri="{28A0092B-C50C-407E-A947-70E740481C1C}">
-                <a14:useLocalDpi xmlns:a14="http://schemas.microsoft.com/office/drawing/2010/main" val="0"/>
-              </a:ext>
-            </a:extLst>
-          </a:blip>
-          <a:stretch>
-            <a:fillRect/>
-          </a:stretch>
-        </p:blipFill>
-        <p:spPr>
-          <a:xfrm>
-            <a:off x="683918" y="1874058"/>
-            <a:ext cx="10824164" cy="4631245"/>
-          </a:xfrm>
-          <a:solidFill>
-            <a:schemeClr val="tx1">
-              <a:lumMod val="95000"/>
-            </a:schemeClr>
-          </a:solidFill>
-        </p:spPr>
-      </p:pic>
-    </p:spTree>
-    <p:extLst>
-      <p:ext uri="{BB962C8B-B14F-4D97-AF65-F5344CB8AC3E}">
-        <p14:creationId xmlns:p14="http://schemas.microsoft.com/office/powerpoint/2010/main" val="120177263"/>
-      </p:ext>
-    </p:extLst>
-  </p:cSld>
-  <p:clrMapOvr>
-    <a:masterClrMapping/>
-  </p:clrMapOvr>
-</p:sld>
-</file>
-
-<file path=ppt/slides/slide9.xml><?xml version="1.0" encoding="utf-8"?>
-<p:sld xmlns:a="http://schemas.openxmlformats.org/drawingml/2006/main" xmlns:r="http://schemas.openxmlformats.org/officeDocument/2006/relationships" xmlns:p="http://schemas.openxmlformats.org/presentationml/2006/main">
-  <p:cSld>
-    <p:spTree>
-      <p:nvGrpSpPr>
-        <p:cNvPr id="1" name=""/>
-        <p:cNvGrpSpPr/>
-        <p:nvPr/>
-      </p:nvGrpSpPr>
-      <p:grpSpPr>
-        <a:xfrm>
-          <a:off x="0" y="0"/>
-          <a:ext cx="0" cy="0"/>
-          <a:chOff x="0" y="0"/>
-          <a:chExt cx="0" cy="0"/>
-        </a:xfrm>
-      </p:grpSpPr>
-      <p:sp>
-        <p:nvSpPr>
-          <p:cNvPr id="2" name="Title 1">
-            <a:extLst>
-              <a:ext uri="{FF2B5EF4-FFF2-40B4-BE49-F238E27FC236}">
-                <a16:creationId xmlns:a16="http://schemas.microsoft.com/office/drawing/2014/main" id="{A7353835-F4C9-43E0-90C6-AE91A74DF4A0}"/>
-              </a:ext>
-            </a:extLst>
-          </p:cNvPr>
-          <p:cNvSpPr>
-            <a:spLocks noGrp="1"/>
-          </p:cNvSpPr>
-          <p:nvPr>
-            <p:ph type="title"/>
-          </p:nvPr>
-        </p:nvSpPr>
-        <p:spPr/>
-        <p:txBody>
-          <a:bodyPr/>
-          <a:lstStyle/>
-          <a:p>
-            <a:r>
-              <a:rPr lang="en-US" dirty="0"/>
-              <a:t>Average price for apps</a:t>
-            </a:r>
-          </a:p>
-        </p:txBody>
-      </p:sp>
-      <p:pic>
-        <p:nvPicPr>
-          <p:cNvPr id="5" name="Content Placeholder 4">
-            <a:extLst>
-              <a:ext uri="{FF2B5EF4-FFF2-40B4-BE49-F238E27FC236}">
-                <a16:creationId xmlns:a16="http://schemas.microsoft.com/office/drawing/2014/main" id="{C1B29888-398B-4CD6-9DF3-AA4C70FE761A}"/>
-              </a:ext>
-            </a:extLst>
-          </p:cNvPr>
-          <p:cNvPicPr>
-            <a:picLocks noGrp="1" noChangeAspect="1"/>
-          </p:cNvPicPr>
-          <p:nvPr>
-            <p:ph idx="1"/>
-          </p:nvPr>
-        </p:nvPicPr>
-        <p:blipFill>
-          <a:blip r:embed="rId3">
-            <a:extLst>
-              <a:ext uri="{28A0092B-C50C-407E-A947-70E740481C1C}">
-                <a14:useLocalDpi xmlns:a14="http://schemas.microsoft.com/office/drawing/2010/main" val="0"/>
-              </a:ext>
-            </a:extLst>
-          </a:blip>
-          <a:stretch>
-            <a:fillRect/>
-          </a:stretch>
-        </p:blipFill>
-        <p:spPr>
-          <a:xfrm>
-            <a:off x="3173778" y="2356852"/>
-            <a:ext cx="5841270" cy="3326984"/>
-          </a:xfrm>
-          <a:solidFill>
-            <a:schemeClr val="tx1">
-              <a:lumMod val="95000"/>
-            </a:schemeClr>
-          </a:solidFill>
-        </p:spPr>
-      </p:pic>
-    </p:spTree>
-    <p:extLst>
-      <p:ext uri="{BB962C8B-B14F-4D97-AF65-F5344CB8AC3E}">
-        <p14:creationId xmlns:p14="http://schemas.microsoft.com/office/powerpoint/2010/main" val="115235099"/>
-      </p:ext>
-    </p:extLst>
-  </p:cSld>
-  <p:clrMapOvr>
-    <a:masterClrMapping/>
-  </p:clrMapOvr>
-</p:sld>
-</file>
-
 <file path=ppt/theme/theme1.xml><?xml version="1.0" encoding="utf-8"?>
 <a:theme xmlns:a="http://schemas.openxmlformats.org/drawingml/2006/main" name="Circuit">
   <a:themeElements>
-    <a:clrScheme name="Circuit">
+    <a:clrScheme name="Custom 1">
       <a:dk1>
         <a:sysClr val="windowText" lastClr="000000"/>
       </a:dk1>
       <a:lt1>
-        <a:sysClr val="window" lastClr="FFFFFF"/>
+        <a:srgbClr val="F2F2F2"/>
       </a:lt1>
       <a:dk2>
-        <a:srgbClr val="134770"/>
+        <a:srgbClr val="252C36"/>
       </a:dk2>
       <a:lt2>
-        <a:srgbClr val="82FFFF"/>
+        <a:srgbClr val="CAD5DA"/>
       </a:lt2>
       <a:accent1>
-        <a:srgbClr val="9ACD4C"/>
+        <a:srgbClr val="4FD093"/>
       </a:accent1>
       <a:accent2>
-        <a:srgbClr val="FAA93A"/>
+        <a:srgbClr val="54BCDF"/>
       </a:accent2>
       <a:accent3>
-        <a:srgbClr val="D35940"/>
+        <a:srgbClr val="A262D0"/>
       </a:accent3>
       <a:accent4>
-        <a:srgbClr val="B258D3"/>
+        <a:srgbClr val="D7537B"/>
       </a:accent4>
       <a:accent5>
-        <a:srgbClr val="63A0CC"/>
+        <a:srgbClr val="E78045"/>
       </a:accent5>
       <a:accent6>
-        <a:srgbClr val="8AC4A7"/>
+        <a:srgbClr val="84C350"/>
       </a:accent6>
       <a:hlink>
-        <a:srgbClr val="B8FA56"/>
+        <a:srgbClr val="22FFFF"/>
       </a:hlink>
       <a:folHlink>
-        <a:srgbClr val="7AF8CC"/>
+        <a:srgbClr val="9BF3FD"/>
       </a:folHlink>
     </a:clrScheme>
     <a:fontScheme name="Circuit">
@@ -15620,7 +15755,7 @@
                 <a:tint val="98000"/>
                 <a:hueMod val="94000"/>
                 <a:satMod val="148000"/>
-                <a:lumMod val="150000"/>
+                <a:lumMod val="140000"/>
               </a:schemeClr>
             </a:gs>
             <a:gs pos="100000">
@@ -15628,7 +15763,7 @@
                 <a:shade val="92000"/>
                 <a:hueMod val="104000"/>
                 <a:satMod val="140000"/>
-                <a:lumMod val="68000"/>
+                <a:lumMod val="48000"/>
               </a:schemeClr>
             </a:gs>
           </a:gsLst>
@@ -15638,16 +15773,16 @@
           <a:blip xmlns:r="http://schemas.openxmlformats.org/officeDocument/2006/relationships" r:embed="rId1">
             <a:duotone>
               <a:schemeClr val="phClr">
-                <a:shade val="88000"/>
+                <a:shade val="48000"/>
                 <a:hueMod val="106000"/>
                 <a:satMod val="140000"/>
-                <a:lumMod val="54000"/>
+                <a:lumMod val="42000"/>
               </a:schemeClr>
               <a:schemeClr val="phClr">
                 <a:tint val="98000"/>
-                <a:hueMod val="90000"/>
-                <a:satMod val="150000"/>
-                <a:lumMod val="160000"/>
+                <a:hueMod val="92000"/>
+                <a:satMod val="220000"/>
+                <a:lumMod val="90000"/>
               </a:schemeClr>
             </a:duotone>
           </a:blip>
@@ -15660,7 +15795,7 @@
   <a:extraClrSchemeLst/>
   <a:extLst>
     <a:ext uri="{05A4C25C-085E-4340-85A3-A5531E510DB2}">
-      <thm15:themeFamily xmlns:thm15="http://schemas.microsoft.com/office/thememl/2012/main" name="Circuit" id="{0AC2F7E7-15F5-431C-B2A2-456FE929F56C}" vid="{0911B802-464C-4241-8DD9-B60FF88E379F}"/>
+      <thm15:themeFamily xmlns:thm15="http://schemas.microsoft.com/office/thememl/2012/main" name="Circuit" id="{0AC2F7E7-15F5-431C-B2A2-456FE929F56C}" vid="{142578CA-DEC9-49C3-80AF-C113973CC9A9}"/>
     </a:ext>
   </a:extLst>
 </a:theme>

</xml_diff>